<commit_message>
Added related works. Picked both titles. Changed bullets on Approach slightly.
</commit_message>
<xml_diff>
--- a/Overcooked AI.pptx
+++ b/Overcooked AI.pptx
@@ -108,7 +108,27 @@
       </a:defRPr>
     </a:lvl9pPr>
   </p:defaultTextStyle>
+  <p:extLst>
+    <p:ext uri="{EFAFB233-063F-42B5-8137-9DF3F51BA10A}">
+      <p15:sldGuideLst xmlns:p15="http://schemas.microsoft.com/office/powerpoint/2012/main">
+        <p15:guide id="1" orient="horz" pos="2160">
+          <p15:clr>
+            <a:srgbClr val="A4A3A4"/>
+          </p15:clr>
+        </p15:guide>
+        <p15:guide id="2" pos="2880">
+          <p15:clr>
+            <a:srgbClr val="A4A3A4"/>
+          </p15:clr>
+        </p15:guide>
+      </p15:sldGuideLst>
+    </p:ext>
+  </p:extLst>
 </p:presentation>
+</file>
+
+<file path=ppt/revisionInfo.xml><?xml version="1.0" encoding="utf-8"?>
+<p1510:revInfo xmlns:a="http://schemas.openxmlformats.org/drawingml/2006/main" xmlns:r="http://schemas.openxmlformats.org/officeDocument/2006/relationships" xmlns:p1510="http://schemas.microsoft.com/office/powerpoint/2015/10/main"/>
 </file>
 
 <file path=ppt/slideLayouts/slideLayout1.xml><?xml version="1.0" encoding="utf-8"?>
@@ -281,10 +301,9 @@
           </a:lstStyle>
           <a:p>
             <a:r>
-              <a:rPr kumimoji="0" lang="en-US" smtClean="0"/>
+              <a:rPr kumimoji="0" lang="en-US"/>
               <a:t>Click to edit Master subtitle style</a:t>
             </a:r>
-            <a:endParaRPr kumimoji="0" lang="en-US"/>
           </a:p>
         </p:txBody>
       </p:sp>
@@ -305,7 +324,7 @@
           <a:p>
             <a:fld id="{297A39A9-956E-43ED-949C-650B51C5AC44}" type="datetimeFigureOut">
               <a:rPr lang="en-US" smtClean="0"/>
-              <a:t>11/11/2017</a:t>
+              <a:t>11/12/2017</a:t>
             </a:fld>
             <a:endParaRPr lang="en-US"/>
           </a:p>
@@ -534,10 +553,9 @@
           </a:lstStyle>
           <a:p>
             <a:r>
-              <a:rPr kumimoji="0" lang="en-US" smtClean="0"/>
+              <a:rPr kumimoji="0" lang="en-US"/>
               <a:t>Click to edit Master title style</a:t>
             </a:r>
-            <a:endParaRPr kumimoji="0" lang="en-US"/>
           </a:p>
         </p:txBody>
       </p:sp>
@@ -582,10 +600,9 @@
           <a:lstStyle/>
           <a:p>
             <a:r>
-              <a:rPr kumimoji="0" lang="en-US" smtClean="0"/>
+              <a:rPr kumimoji="0" lang="en-US"/>
               <a:t>Click to edit Master title style</a:t>
             </a:r>
-            <a:endParaRPr kumimoji="0" lang="en-US"/>
           </a:p>
         </p:txBody>
       </p:sp>
@@ -606,35 +623,35 @@
           <a:p>
             <a:pPr lvl="0" eaLnBrk="1" latinLnBrk="0" hangingPunct="1"/>
             <a:r>
-              <a:rPr lang="en-US" smtClean="0"/>
+              <a:rPr lang="en-US"/>
               <a:t>Click to edit Master text styles</a:t>
             </a:r>
           </a:p>
           <a:p>
             <a:pPr lvl="1" eaLnBrk="1" latinLnBrk="0" hangingPunct="1"/>
             <a:r>
-              <a:rPr lang="en-US" smtClean="0"/>
+              <a:rPr lang="en-US"/>
               <a:t>Second level</a:t>
             </a:r>
           </a:p>
           <a:p>
             <a:pPr lvl="2" eaLnBrk="1" latinLnBrk="0" hangingPunct="1"/>
             <a:r>
-              <a:rPr lang="en-US" smtClean="0"/>
+              <a:rPr lang="en-US"/>
               <a:t>Third level</a:t>
             </a:r>
           </a:p>
           <a:p>
             <a:pPr lvl="3" eaLnBrk="1" latinLnBrk="0" hangingPunct="1"/>
             <a:r>
-              <a:rPr lang="en-US" smtClean="0"/>
+              <a:rPr lang="en-US"/>
               <a:t>Fourth level</a:t>
             </a:r>
           </a:p>
           <a:p>
             <a:pPr lvl="4" eaLnBrk="1" latinLnBrk="0" hangingPunct="1"/>
             <a:r>
-              <a:rPr lang="en-US" smtClean="0"/>
+              <a:rPr lang="en-US"/>
               <a:t>Fifth level</a:t>
             </a:r>
             <a:endParaRPr kumimoji="0" lang="en-US"/>
@@ -658,7 +675,7 @@
           <a:p>
             <a:fld id="{297A39A9-956E-43ED-949C-650B51C5AC44}" type="datetimeFigureOut">
               <a:rPr lang="en-US" smtClean="0"/>
-              <a:t>11/11/2017</a:t>
+              <a:t>11/12/2017</a:t>
             </a:fld>
             <a:endParaRPr lang="en-US"/>
           </a:p>
@@ -752,10 +769,9 @@
           <a:lstStyle/>
           <a:p>
             <a:r>
-              <a:rPr kumimoji="0" lang="en-US" smtClean="0"/>
+              <a:rPr kumimoji="0" lang="en-US"/>
               <a:t>Click to edit Master title style</a:t>
             </a:r>
-            <a:endParaRPr kumimoji="0" lang="en-US"/>
           </a:p>
         </p:txBody>
       </p:sp>
@@ -781,35 +797,35 @@
           <a:p>
             <a:pPr lvl="0" eaLnBrk="1" latinLnBrk="0" hangingPunct="1"/>
             <a:r>
-              <a:rPr lang="en-US" smtClean="0"/>
+              <a:rPr lang="en-US"/>
               <a:t>Click to edit Master text styles</a:t>
             </a:r>
           </a:p>
           <a:p>
             <a:pPr lvl="1" eaLnBrk="1" latinLnBrk="0" hangingPunct="1"/>
             <a:r>
-              <a:rPr lang="en-US" smtClean="0"/>
+              <a:rPr lang="en-US"/>
               <a:t>Second level</a:t>
             </a:r>
           </a:p>
           <a:p>
             <a:pPr lvl="2" eaLnBrk="1" latinLnBrk="0" hangingPunct="1"/>
             <a:r>
-              <a:rPr lang="en-US" smtClean="0"/>
+              <a:rPr lang="en-US"/>
               <a:t>Third level</a:t>
             </a:r>
           </a:p>
           <a:p>
             <a:pPr lvl="3" eaLnBrk="1" latinLnBrk="0" hangingPunct="1"/>
             <a:r>
-              <a:rPr lang="en-US" smtClean="0"/>
+              <a:rPr lang="en-US"/>
               <a:t>Fourth level</a:t>
             </a:r>
           </a:p>
           <a:p>
             <a:pPr lvl="4" eaLnBrk="1" latinLnBrk="0" hangingPunct="1"/>
             <a:r>
-              <a:rPr lang="en-US" smtClean="0"/>
+              <a:rPr lang="en-US"/>
               <a:t>Fifth level</a:t>
             </a:r>
             <a:endParaRPr kumimoji="0" lang="en-US"/>
@@ -833,7 +849,7 @@
           <a:p>
             <a:fld id="{297A39A9-956E-43ED-949C-650B51C5AC44}" type="datetimeFigureOut">
               <a:rPr lang="en-US" smtClean="0"/>
-              <a:t>11/11/2017</a:t>
+              <a:t>11/12/2017</a:t>
             </a:fld>
             <a:endParaRPr lang="en-US"/>
           </a:p>
@@ -922,10 +938,9 @@
           <a:lstStyle/>
           <a:p>
             <a:r>
-              <a:rPr kumimoji="0" lang="en-US" smtClean="0"/>
+              <a:rPr kumimoji="0" lang="en-US"/>
               <a:t>Click to edit Master title style</a:t>
             </a:r>
-            <a:endParaRPr kumimoji="0" lang="en-US"/>
           </a:p>
         </p:txBody>
       </p:sp>
@@ -946,7 +961,7 @@
           <a:p>
             <a:fld id="{297A39A9-956E-43ED-949C-650B51C5AC44}" type="datetimeFigureOut">
               <a:rPr lang="en-US" smtClean="0"/>
-              <a:t>11/11/2017</a:t>
+              <a:t>11/12/2017</a:t>
             </a:fld>
             <a:endParaRPr lang="en-US"/>
           </a:p>
@@ -1016,35 +1031,35 @@
           <a:p>
             <a:pPr lvl="0" eaLnBrk="1" latinLnBrk="0" hangingPunct="1"/>
             <a:r>
-              <a:rPr lang="en-US" smtClean="0"/>
+              <a:rPr lang="en-US"/>
               <a:t>Click to edit Master text styles</a:t>
             </a:r>
           </a:p>
           <a:p>
             <a:pPr lvl="1" eaLnBrk="1" latinLnBrk="0" hangingPunct="1"/>
             <a:r>
-              <a:rPr lang="en-US" smtClean="0"/>
+              <a:rPr lang="en-US"/>
               <a:t>Second level</a:t>
             </a:r>
           </a:p>
           <a:p>
             <a:pPr lvl="2" eaLnBrk="1" latinLnBrk="0" hangingPunct="1"/>
             <a:r>
-              <a:rPr lang="en-US" smtClean="0"/>
+              <a:rPr lang="en-US"/>
               <a:t>Third level</a:t>
             </a:r>
           </a:p>
           <a:p>
             <a:pPr lvl="3" eaLnBrk="1" latinLnBrk="0" hangingPunct="1"/>
             <a:r>
-              <a:rPr lang="en-US" smtClean="0"/>
+              <a:rPr lang="en-US"/>
               <a:t>Fourth level</a:t>
             </a:r>
           </a:p>
           <a:p>
             <a:pPr lvl="4" eaLnBrk="1" latinLnBrk="0" hangingPunct="1"/>
             <a:r>
-              <a:rPr lang="en-US" smtClean="0"/>
+              <a:rPr lang="en-US"/>
               <a:t>Fifth level</a:t>
             </a:r>
             <a:endParaRPr kumimoji="0" lang="en-US"/>
@@ -1201,10 +1216,9 @@
           </a:lstStyle>
           <a:p>
             <a:r>
-              <a:rPr kumimoji="0" lang="en-US" smtClean="0"/>
+              <a:rPr kumimoji="0" lang="en-US"/>
               <a:t>Click to edit Master title style</a:t>
             </a:r>
-            <a:endParaRPr kumimoji="0" lang="en-US"/>
           </a:p>
         </p:txBody>
       </p:sp>
@@ -1281,7 +1295,7 @@
           <a:p>
             <a:pPr lvl="0" eaLnBrk="1" latinLnBrk="0" hangingPunct="1"/>
             <a:r>
-              <a:rPr kumimoji="0" lang="en-US" smtClean="0"/>
+              <a:rPr kumimoji="0" lang="en-US"/>
               <a:t>Click to edit Master text styles</a:t>
             </a:r>
           </a:p>
@@ -1304,7 +1318,7 @@
           <a:p>
             <a:fld id="{297A39A9-956E-43ED-949C-650B51C5AC44}" type="datetimeFigureOut">
               <a:rPr lang="en-US" smtClean="0"/>
-              <a:t>11/11/2017</a:t>
+              <a:t>11/12/2017</a:t>
             </a:fld>
             <a:endParaRPr lang="en-US"/>
           </a:p>
@@ -1545,10 +1559,9 @@
           <a:lstStyle/>
           <a:p>
             <a:r>
-              <a:rPr kumimoji="0" lang="en-US" smtClean="0"/>
+              <a:rPr kumimoji="0" lang="en-US"/>
               <a:t>Click to edit Master title style</a:t>
             </a:r>
-            <a:endParaRPr kumimoji="0" lang="en-US"/>
           </a:p>
         </p:txBody>
       </p:sp>
@@ -1569,7 +1582,7 @@
           <a:p>
             <a:fld id="{297A39A9-956E-43ED-949C-650B51C5AC44}" type="datetimeFigureOut">
               <a:rPr lang="en-US" smtClean="0"/>
-              <a:t>11/11/2017</a:t>
+              <a:t>11/12/2017</a:t>
             </a:fld>
             <a:endParaRPr lang="en-US"/>
           </a:p>
@@ -1639,35 +1652,35 @@
           <a:p>
             <a:pPr lvl="0" eaLnBrk="1" latinLnBrk="0" hangingPunct="1"/>
             <a:r>
-              <a:rPr lang="en-US" smtClean="0"/>
+              <a:rPr lang="en-US"/>
               <a:t>Click to edit Master text styles</a:t>
             </a:r>
           </a:p>
           <a:p>
             <a:pPr lvl="1" eaLnBrk="1" latinLnBrk="0" hangingPunct="1"/>
             <a:r>
-              <a:rPr lang="en-US" smtClean="0"/>
+              <a:rPr lang="en-US"/>
               <a:t>Second level</a:t>
             </a:r>
           </a:p>
           <a:p>
             <a:pPr lvl="2" eaLnBrk="1" latinLnBrk="0" hangingPunct="1"/>
             <a:r>
-              <a:rPr lang="en-US" smtClean="0"/>
+              <a:rPr lang="en-US"/>
               <a:t>Third level</a:t>
             </a:r>
           </a:p>
           <a:p>
             <a:pPr lvl="3" eaLnBrk="1" latinLnBrk="0" hangingPunct="1"/>
             <a:r>
-              <a:rPr lang="en-US" smtClean="0"/>
+              <a:rPr lang="en-US"/>
               <a:t>Fourth level</a:t>
             </a:r>
           </a:p>
           <a:p>
             <a:pPr lvl="4" eaLnBrk="1" latinLnBrk="0" hangingPunct="1"/>
             <a:r>
-              <a:rPr lang="en-US" smtClean="0"/>
+              <a:rPr lang="en-US"/>
               <a:t>Fifth level</a:t>
             </a:r>
             <a:endParaRPr kumimoji="0" lang="en-US"/>
@@ -1696,35 +1709,35 @@
           <a:p>
             <a:pPr lvl="0" eaLnBrk="1" latinLnBrk="0" hangingPunct="1"/>
             <a:r>
-              <a:rPr lang="en-US" smtClean="0"/>
+              <a:rPr lang="en-US"/>
               <a:t>Click to edit Master text styles</a:t>
             </a:r>
           </a:p>
           <a:p>
             <a:pPr lvl="1" eaLnBrk="1" latinLnBrk="0" hangingPunct="1"/>
             <a:r>
-              <a:rPr lang="en-US" smtClean="0"/>
+              <a:rPr lang="en-US"/>
               <a:t>Second level</a:t>
             </a:r>
           </a:p>
           <a:p>
             <a:pPr lvl="2" eaLnBrk="1" latinLnBrk="0" hangingPunct="1"/>
             <a:r>
-              <a:rPr lang="en-US" smtClean="0"/>
+              <a:rPr lang="en-US"/>
               <a:t>Third level</a:t>
             </a:r>
           </a:p>
           <a:p>
             <a:pPr lvl="3" eaLnBrk="1" latinLnBrk="0" hangingPunct="1"/>
             <a:r>
-              <a:rPr lang="en-US" smtClean="0"/>
+              <a:rPr lang="en-US"/>
               <a:t>Fourth level</a:t>
             </a:r>
           </a:p>
           <a:p>
             <a:pPr lvl="4" eaLnBrk="1" latinLnBrk="0" hangingPunct="1"/>
             <a:r>
-              <a:rPr lang="en-US" smtClean="0"/>
+              <a:rPr lang="en-US"/>
               <a:t>Fifth level</a:t>
             </a:r>
             <a:endParaRPr kumimoji="0" lang="en-US"/>
@@ -1781,10 +1794,9 @@
           </a:lstStyle>
           <a:p>
             <a:r>
-              <a:rPr kumimoji="0" lang="en-US" smtClean="0"/>
+              <a:rPr kumimoji="0" lang="en-US"/>
               <a:t>Click to edit Master title style</a:t>
             </a:r>
-            <a:endParaRPr kumimoji="0" lang="en-US"/>
           </a:p>
         </p:txBody>
       </p:sp>
@@ -1845,7 +1857,7 @@
           <a:p>
             <a:pPr lvl="0" eaLnBrk="1" latinLnBrk="0" hangingPunct="1"/>
             <a:r>
-              <a:rPr kumimoji="0" lang="en-US" smtClean="0"/>
+              <a:rPr kumimoji="0" lang="en-US"/>
               <a:t>Click to edit Master text styles</a:t>
             </a:r>
           </a:p>
@@ -1908,7 +1920,7 @@
           <a:p>
             <a:pPr lvl="0" eaLnBrk="1" latinLnBrk="0" hangingPunct="1"/>
             <a:r>
-              <a:rPr kumimoji="0" lang="en-US" smtClean="0"/>
+              <a:rPr kumimoji="0" lang="en-US"/>
               <a:t>Click to edit Master text styles</a:t>
             </a:r>
           </a:p>
@@ -1931,7 +1943,7 @@
           <a:p>
             <a:fld id="{297A39A9-956E-43ED-949C-650B51C5AC44}" type="datetimeFigureOut">
               <a:rPr lang="en-US" smtClean="0"/>
-              <a:t>11/11/2017</a:t>
+              <a:t>11/12/2017</a:t>
             </a:fld>
             <a:endParaRPr lang="en-US"/>
           </a:p>
@@ -2001,35 +2013,35 @@
           <a:p>
             <a:pPr lvl="0" eaLnBrk="1" latinLnBrk="0" hangingPunct="1"/>
             <a:r>
-              <a:rPr lang="en-US" smtClean="0"/>
+              <a:rPr lang="en-US"/>
               <a:t>Click to edit Master text styles</a:t>
             </a:r>
           </a:p>
           <a:p>
             <a:pPr lvl="1" eaLnBrk="1" latinLnBrk="0" hangingPunct="1"/>
             <a:r>
-              <a:rPr lang="en-US" smtClean="0"/>
+              <a:rPr lang="en-US"/>
               <a:t>Second level</a:t>
             </a:r>
           </a:p>
           <a:p>
             <a:pPr lvl="2" eaLnBrk="1" latinLnBrk="0" hangingPunct="1"/>
             <a:r>
-              <a:rPr lang="en-US" smtClean="0"/>
+              <a:rPr lang="en-US"/>
               <a:t>Third level</a:t>
             </a:r>
           </a:p>
           <a:p>
             <a:pPr lvl="3" eaLnBrk="1" latinLnBrk="0" hangingPunct="1"/>
             <a:r>
-              <a:rPr lang="en-US" smtClean="0"/>
+              <a:rPr lang="en-US"/>
               <a:t>Fourth level</a:t>
             </a:r>
           </a:p>
           <a:p>
             <a:pPr lvl="4" eaLnBrk="1" latinLnBrk="0" hangingPunct="1"/>
             <a:r>
-              <a:rPr lang="en-US" smtClean="0"/>
+              <a:rPr lang="en-US"/>
               <a:t>Fifth level</a:t>
             </a:r>
             <a:endParaRPr kumimoji="0" lang="en-US"/>
@@ -2058,35 +2070,35 @@
           <a:p>
             <a:pPr lvl="0" eaLnBrk="1" latinLnBrk="0" hangingPunct="1"/>
             <a:r>
-              <a:rPr lang="en-US" smtClean="0"/>
+              <a:rPr lang="en-US"/>
               <a:t>Click to edit Master text styles</a:t>
             </a:r>
           </a:p>
           <a:p>
             <a:pPr lvl="1" eaLnBrk="1" latinLnBrk="0" hangingPunct="1"/>
             <a:r>
-              <a:rPr lang="en-US" smtClean="0"/>
+              <a:rPr lang="en-US"/>
               <a:t>Second level</a:t>
             </a:r>
           </a:p>
           <a:p>
             <a:pPr lvl="2" eaLnBrk="1" latinLnBrk="0" hangingPunct="1"/>
             <a:r>
-              <a:rPr lang="en-US" smtClean="0"/>
+              <a:rPr lang="en-US"/>
               <a:t>Third level</a:t>
             </a:r>
           </a:p>
           <a:p>
             <a:pPr lvl="3" eaLnBrk="1" latinLnBrk="0" hangingPunct="1"/>
             <a:r>
-              <a:rPr lang="en-US" smtClean="0"/>
+              <a:rPr lang="en-US"/>
               <a:t>Fourth level</a:t>
             </a:r>
           </a:p>
           <a:p>
             <a:pPr lvl="4" eaLnBrk="1" latinLnBrk="0" hangingPunct="1"/>
             <a:r>
-              <a:rPr lang="en-US" smtClean="0"/>
+              <a:rPr lang="en-US"/>
               <a:t>Fifth level</a:t>
             </a:r>
             <a:endParaRPr kumimoji="0" lang="en-US"/>
@@ -2134,10 +2146,9 @@
           <a:lstStyle/>
           <a:p>
             <a:r>
-              <a:rPr kumimoji="0" lang="en-US" smtClean="0"/>
+              <a:rPr kumimoji="0" lang="en-US"/>
               <a:t>Click to edit Master title style</a:t>
             </a:r>
-            <a:endParaRPr kumimoji="0" lang="en-US"/>
           </a:p>
         </p:txBody>
       </p:sp>
@@ -2158,7 +2169,7 @@
           <a:p>
             <a:fld id="{297A39A9-956E-43ED-949C-650B51C5AC44}" type="datetimeFigureOut">
               <a:rPr lang="en-US" smtClean="0"/>
-              <a:t>11/11/2017</a:t>
+              <a:t>11/12/2017</a:t>
             </a:fld>
             <a:endParaRPr lang="en-US"/>
           </a:p>
@@ -2248,7 +2259,7 @@
           <a:p>
             <a:fld id="{297A39A9-956E-43ED-949C-650B51C5AC44}" type="datetimeFigureOut">
               <a:rPr lang="en-US" smtClean="0"/>
-              <a:t>11/11/2017</a:t>
+              <a:t>11/12/2017</a:t>
             </a:fld>
             <a:endParaRPr lang="en-US"/>
           </a:p>
@@ -2442,10 +2453,9 @@
           </a:lstStyle>
           <a:p>
             <a:r>
-              <a:rPr kumimoji="0" lang="en-US" smtClean="0"/>
+              <a:rPr kumimoji="0" lang="en-US"/>
               <a:t>Click to edit Master title style</a:t>
             </a:r>
-            <a:endParaRPr kumimoji="0" lang="en-US"/>
           </a:p>
         </p:txBody>
       </p:sp>
@@ -2492,7 +2502,7 @@
           <a:p>
             <a:pPr lvl="0" eaLnBrk="1" latinLnBrk="0" hangingPunct="1"/>
             <a:r>
-              <a:rPr kumimoji="0" lang="en-US" smtClean="0"/>
+              <a:rPr kumimoji="0" lang="en-US"/>
               <a:t>Click to edit Master text styles</a:t>
             </a:r>
           </a:p>
@@ -2515,7 +2525,7 @@
           <a:p>
             <a:fld id="{297A39A9-956E-43ED-949C-650B51C5AC44}" type="datetimeFigureOut">
               <a:rPr lang="en-US" smtClean="0"/>
-              <a:t>11/11/2017</a:t>
+              <a:t>11/12/2017</a:t>
             </a:fld>
             <a:endParaRPr lang="en-US"/>
           </a:p>
@@ -2585,35 +2595,35 @@
           <a:p>
             <a:pPr lvl="0" eaLnBrk="1" latinLnBrk="0" hangingPunct="1"/>
             <a:r>
-              <a:rPr lang="en-US" smtClean="0"/>
+              <a:rPr lang="en-US"/>
               <a:t>Click to edit Master text styles</a:t>
             </a:r>
           </a:p>
           <a:p>
             <a:pPr lvl="1" eaLnBrk="1" latinLnBrk="0" hangingPunct="1"/>
             <a:r>
-              <a:rPr lang="en-US" smtClean="0"/>
+              <a:rPr lang="en-US"/>
               <a:t>Second level</a:t>
             </a:r>
           </a:p>
           <a:p>
             <a:pPr lvl="2" eaLnBrk="1" latinLnBrk="0" hangingPunct="1"/>
             <a:r>
-              <a:rPr lang="en-US" smtClean="0"/>
+              <a:rPr lang="en-US"/>
               <a:t>Third level</a:t>
             </a:r>
           </a:p>
           <a:p>
             <a:pPr lvl="3" eaLnBrk="1" latinLnBrk="0" hangingPunct="1"/>
             <a:r>
-              <a:rPr lang="en-US" smtClean="0"/>
+              <a:rPr lang="en-US"/>
               <a:t>Fourth level</a:t>
             </a:r>
           </a:p>
           <a:p>
             <a:pPr lvl="4" eaLnBrk="1" latinLnBrk="0" hangingPunct="1"/>
             <a:r>
-              <a:rPr lang="en-US" smtClean="0"/>
+              <a:rPr lang="en-US"/>
               <a:t>Fifth level</a:t>
             </a:r>
             <a:endParaRPr kumimoji="0" lang="en-US"/>
@@ -2673,10 +2683,9 @@
           </a:lstStyle>
           <a:p>
             <a:r>
-              <a:rPr kumimoji="0" lang="en-US" smtClean="0"/>
+              <a:rPr kumimoji="0" lang="en-US"/>
               <a:t>Click to edit Master title style</a:t>
             </a:r>
-            <a:endParaRPr kumimoji="0" lang="en-US"/>
           </a:p>
         </p:txBody>
       </p:sp>
@@ -2720,7 +2729,7 @@
           <a:p>
             <a:pPr lvl="0" eaLnBrk="1" latinLnBrk="0" hangingPunct="1"/>
             <a:r>
-              <a:rPr kumimoji="0" lang="en-US" smtClean="0"/>
+              <a:rPr kumimoji="0" lang="en-US"/>
               <a:t>Click to edit Master text styles</a:t>
             </a:r>
           </a:p>
@@ -2743,7 +2752,7 @@
           <a:p>
             <a:fld id="{297A39A9-956E-43ED-949C-650B51C5AC44}" type="datetimeFigureOut">
               <a:rPr lang="en-US" smtClean="0"/>
-              <a:t>11/11/2017</a:t>
+              <a:t>11/12/2017</a:t>
             </a:fld>
             <a:endParaRPr lang="en-US"/>
           </a:p>
@@ -2983,7 +2992,7 @@
           </a:lstStyle>
           <a:p>
             <a:r>
-              <a:rPr kumimoji="0" lang="en-US" smtClean="0"/>
+              <a:rPr kumimoji="0" lang="en-US"/>
               <a:t>Click icon to add picture</a:t>
             </a:r>
             <a:endParaRPr kumimoji="0" lang="en-US" dirty="0"/>
@@ -3140,10 +3149,9 @@
           <a:lstStyle/>
           <a:p>
             <a:r>
-              <a:rPr kumimoji="0" lang="en-US" smtClean="0"/>
+              <a:rPr kumimoji="0" lang="en-US"/>
               <a:t>Click to edit Master title style</a:t>
             </a:r>
-            <a:endParaRPr kumimoji="0" lang="en-US"/>
           </a:p>
         </p:txBody>
       </p:sp>
@@ -3174,38 +3182,37 @@
           <a:p>
             <a:pPr lvl="0" eaLnBrk="1" latinLnBrk="0" hangingPunct="1"/>
             <a:r>
-              <a:rPr kumimoji="0" lang="en-US" smtClean="0"/>
+              <a:rPr kumimoji="0" lang="en-US"/>
               <a:t>Click to edit Master text styles</a:t>
             </a:r>
           </a:p>
           <a:p>
             <a:pPr lvl="1" eaLnBrk="1" latinLnBrk="0" hangingPunct="1"/>
             <a:r>
-              <a:rPr kumimoji="0" lang="en-US" smtClean="0"/>
+              <a:rPr kumimoji="0" lang="en-US"/>
               <a:t>Second level</a:t>
             </a:r>
           </a:p>
           <a:p>
             <a:pPr lvl="2" eaLnBrk="1" latinLnBrk="0" hangingPunct="1"/>
             <a:r>
-              <a:rPr kumimoji="0" lang="en-US" smtClean="0"/>
+              <a:rPr kumimoji="0" lang="en-US"/>
               <a:t>Third level</a:t>
             </a:r>
           </a:p>
           <a:p>
             <a:pPr lvl="3" eaLnBrk="1" latinLnBrk="0" hangingPunct="1"/>
             <a:r>
-              <a:rPr kumimoji="0" lang="en-US" smtClean="0"/>
+              <a:rPr kumimoji="0" lang="en-US"/>
               <a:t>Fourth level</a:t>
             </a:r>
           </a:p>
           <a:p>
             <a:pPr lvl="4" eaLnBrk="1" latinLnBrk="0" hangingPunct="1"/>
             <a:r>
-              <a:rPr kumimoji="0" lang="en-US" smtClean="0"/>
+              <a:rPr kumimoji="0" lang="en-US"/>
               <a:t>Fifth level</a:t>
             </a:r>
-            <a:endParaRPr kumimoji="0" lang="en-US"/>
           </a:p>
         </p:txBody>
       </p:sp>
@@ -3242,7 +3249,7 @@
           <a:p>
             <a:fld id="{297A39A9-956E-43ED-949C-650B51C5AC44}" type="datetimeFigureOut">
               <a:rPr lang="en-US" smtClean="0"/>
-              <a:t>11/11/2017</a:t>
+              <a:t>11/12/2017</a:t>
             </a:fld>
             <a:endParaRPr lang="en-US"/>
           </a:p>
@@ -3662,10 +3669,15 @@
           <a:lstStyle/>
           <a:p>
             <a:r>
-              <a:rPr lang="en-US" dirty="0" smtClean="0"/>
-              <a:t>Roger Liu, Stephen Chen</a:t>
-            </a:r>
-            <a:endParaRPr lang="en-US" dirty="0"/>
+              <a:rPr lang="en-US" dirty="0"/>
+              <a:t>Roger Liu</a:t>
+            </a:r>
+          </a:p>
+          <a:p>
+            <a:r>
+              <a:rPr lang="en-US" dirty="0"/>
+              <a:t>Stephen Chen</a:t>
+            </a:r>
           </a:p>
         </p:txBody>
       </p:sp>
@@ -3682,54 +3694,53 @@
         <p:spPr/>
         <p:txBody>
           <a:bodyPr>
-            <a:normAutofit fontScale="90000"/>
+            <a:normAutofit/>
           </a:bodyPr>
           <a:lstStyle/>
           <a:p>
             <a:r>
-              <a:rPr lang="en-US" dirty="0" smtClean="0"/>
-              <a:t>[Meme Title: Cooking Up a Plan]</a:t>
-            </a:r>
-            <a:br>
-              <a:rPr lang="en-US" dirty="0" smtClean="0"/>
-            </a:br>
-            <a:r>
-              <a:rPr lang="en-US" dirty="0" smtClean="0"/>
-              <a:t>[</a:t>
-            </a:r>
-            <a:r>
-              <a:rPr lang="en-US" dirty="0" err="1" smtClean="0"/>
-              <a:t>Srs</a:t>
-            </a:r>
-            <a:r>
-              <a:rPr lang="en-US" dirty="0" smtClean="0"/>
-              <a:t> </a:t>
-            </a:r>
-            <a:r>
-              <a:rPr lang="en-US" dirty="0" err="1"/>
-              <a:t>B</a:t>
-            </a:r>
-            <a:r>
-              <a:rPr lang="en-US" dirty="0" err="1" smtClean="0"/>
-              <a:t>sns</a:t>
-            </a:r>
-            <a:r>
-              <a:rPr lang="en-US" dirty="0" smtClean="0"/>
-              <a:t> Title: </a:t>
-            </a:r>
-            <a:r>
               <a:rPr lang="en-US" dirty="0"/>
+              <a:t>Cooking Up a Plan</a:t>
+            </a:r>
+          </a:p>
+        </p:txBody>
+      </p:sp>
+      <p:sp>
+        <p:nvSpPr>
+          <p:cNvPr id="5" name="TextBox 4">
+            <a:extLst>
+              <a:ext uri="{FF2B5EF4-FFF2-40B4-BE49-F238E27FC236}">
+                <a16:creationId xmlns:a16="http://schemas.microsoft.com/office/drawing/2014/main" id="{EFD48E1C-3717-4DA9-B000-A564378A81CE}"/>
+              </a:ext>
+            </a:extLst>
+          </p:cNvPr>
+          <p:cNvSpPr txBox="1"/>
+          <p:nvPr/>
+        </p:nvSpPr>
+        <p:spPr>
+          <a:xfrm>
+            <a:off x="2915296" y="5167404"/>
+            <a:ext cx="3313408" cy="369332"/>
+          </a:xfrm>
+          <a:prstGeom prst="rect">
+            <a:avLst/>
+          </a:prstGeom>
+          <a:noFill/>
+        </p:spPr>
+        <p:txBody>
+          <a:bodyPr wrap="none" rtlCol="0">
+            <a:spAutoFit/>
+          </a:bodyPr>
+          <a:lstStyle/>
+          <a:p>
+            <a:r>
+              <a:rPr lang="en-US" i="1" dirty="0"/>
               <a:t>Task Planning for the Game </a:t>
             </a:r>
             <a:r>
-              <a:rPr lang="en-US" i="1" dirty="0" smtClean="0"/>
+              <a:rPr lang="en-US" dirty="0"/>
               <a:t>Overcooked</a:t>
             </a:r>
-            <a:r>
-              <a:rPr lang="en-US" dirty="0" smtClean="0"/>
-              <a:t>]</a:t>
-            </a:r>
-            <a:endParaRPr lang="en-US" dirty="0"/>
           </a:p>
         </p:txBody>
       </p:sp>
@@ -3774,10 +3785,9 @@
           <a:lstStyle/>
           <a:p>
             <a:r>
-              <a:rPr lang="en-US" dirty="0" smtClean="0"/>
+              <a:rPr lang="en-US" dirty="0"/>
               <a:t>What is Overcooked?</a:t>
             </a:r>
-            <a:endParaRPr lang="en-US" dirty="0"/>
           </a:p>
         </p:txBody>
       </p:sp>
@@ -3804,49 +3814,31 @@
           <a:lstStyle/>
           <a:p>
             <a:r>
-              <a:rPr lang="en-US" i="1" dirty="0" smtClean="0"/>
+              <a:rPr lang="en-US" i="1" dirty="0"/>
               <a:t>Overcooked </a:t>
             </a:r>
             <a:r>
-              <a:rPr lang="en-US" dirty="0" smtClean="0"/>
-              <a:t>is a </a:t>
-            </a:r>
-            <a:r>
-              <a:rPr lang="en-US" dirty="0" smtClean="0"/>
-              <a:t>cooperative cooking game</a:t>
-            </a:r>
-          </a:p>
-          <a:p>
-            <a:r>
-              <a:rPr lang="en-US" dirty="0" smtClean="0"/>
-              <a:t>Players control </a:t>
-            </a:r>
-            <a:r>
-              <a:rPr lang="en-US" dirty="0" smtClean="0"/>
-              <a:t>chefs </a:t>
-            </a:r>
-            <a:r>
-              <a:rPr lang="en-US" dirty="0" smtClean="0"/>
-              <a:t>and prepare </a:t>
-            </a:r>
-            <a:r>
-              <a:rPr lang="en-US" dirty="0" smtClean="0"/>
-              <a:t>meals for incoming orders in real-time.</a:t>
-            </a:r>
-            <a:endParaRPr lang="en-US" dirty="0" smtClean="0"/>
-          </a:p>
-          <a:p>
-            <a:r>
-              <a:rPr lang="en-US" dirty="0" smtClean="0"/>
+              <a:rPr lang="en-US" dirty="0"/>
+              <a:t>is a cooperative cooking game</a:t>
+            </a:r>
+          </a:p>
+          <a:p>
+            <a:r>
+              <a:rPr lang="en-US" dirty="0"/>
+              <a:t>Players control chefs and prepare meals for incoming orders in real-time.</a:t>
+            </a:r>
+          </a:p>
+          <a:p>
+            <a:r>
+              <a:rPr lang="en-US" dirty="0"/>
               <a:t>Creating a meal following involves a series of steps.</a:t>
             </a:r>
           </a:p>
           <a:p>
             <a:r>
-              <a:rPr lang="en-US" dirty="0" smtClean="0"/>
+              <a:rPr lang="en-US" dirty="0"/>
               <a:t>Completing meals faster rewards more points.</a:t>
             </a:r>
-            <a:endParaRPr lang="en-US" dirty="0"/>
           </a:p>
         </p:txBody>
       </p:sp>
@@ -4119,10 +4111,9 @@
           <a:lstStyle/>
           <a:p>
             <a:r>
-              <a:rPr lang="en-US" dirty="0" smtClean="0"/>
+              <a:rPr lang="en-US" dirty="0"/>
               <a:t>Get Orders</a:t>
             </a:r>
-            <a:endParaRPr lang="en-US" dirty="0"/>
           </a:p>
         </p:txBody>
       </p:sp>
@@ -4149,10 +4140,9 @@
           <a:lstStyle/>
           <a:p>
             <a:r>
-              <a:rPr lang="en-US" dirty="0" smtClean="0"/>
+              <a:rPr lang="en-US" dirty="0"/>
               <a:t>Follow Recipes</a:t>
             </a:r>
-            <a:endParaRPr lang="en-US" dirty="0"/>
           </a:p>
         </p:txBody>
       </p:sp>
@@ -4179,10 +4169,9 @@
           <a:lstStyle/>
           <a:p>
             <a:r>
-              <a:rPr lang="en-US" dirty="0" smtClean="0"/>
+              <a:rPr lang="en-US" dirty="0"/>
               <a:t>Organize Tasks</a:t>
             </a:r>
-            <a:endParaRPr lang="en-US" dirty="0"/>
           </a:p>
         </p:txBody>
       </p:sp>
@@ -4209,10 +4198,9 @@
           <a:lstStyle/>
           <a:p>
             <a:r>
-              <a:rPr lang="en-US" dirty="0" smtClean="0"/>
+              <a:rPr lang="en-US" dirty="0"/>
               <a:t>Complete Meals</a:t>
             </a:r>
-            <a:endParaRPr lang="en-US" dirty="0"/>
           </a:p>
         </p:txBody>
       </p:sp>
@@ -4257,10 +4245,9 @@
           <a:lstStyle/>
           <a:p>
             <a:r>
-              <a:rPr lang="en-US" dirty="0" smtClean="0"/>
+              <a:rPr lang="en-US" dirty="0"/>
               <a:t>Related Work</a:t>
             </a:r>
-            <a:endParaRPr lang="en-US" dirty="0"/>
           </a:p>
         </p:txBody>
       </p:sp>
@@ -4276,20 +4263,148 @@
         </p:nvSpPr>
         <p:spPr/>
         <p:txBody>
-          <a:bodyPr/>
-          <a:lstStyle/>
-          <a:p>
-            <a:r>
-              <a:rPr lang="en-US" dirty="0" smtClean="0"/>
-              <a:t>Symbolic planning</a:t>
-            </a:r>
-          </a:p>
-          <a:p>
-            <a:r>
-              <a:rPr lang="en-US" dirty="0" smtClean="0"/>
-              <a:t>Planning with Multiple Agents</a:t>
-            </a:r>
-            <a:endParaRPr lang="en-US" dirty="0"/>
+          <a:bodyPr>
+            <a:normAutofit fontScale="92500" lnSpcReduction="20000"/>
+          </a:bodyPr>
+          <a:lstStyle/>
+          <a:p>
+            <a:r>
+              <a:rPr lang="en-US" dirty="0"/>
+              <a:t>Graph Planning</a:t>
+            </a:r>
+          </a:p>
+          <a:p>
+            <a:pPr lvl="1"/>
+            <a:r>
+              <a:rPr lang="en-US" dirty="0" err="1"/>
+              <a:t>Kamel</a:t>
+            </a:r>
+            <a:r>
+              <a:rPr lang="en-US" dirty="0"/>
+              <a:t> and Syed. </a:t>
+            </a:r>
+            <a:r>
+              <a:rPr lang="en-US" i="1" dirty="0"/>
+              <a:t>Task Decomposition and Plan Generation in Multiagent Domains.</a:t>
+            </a:r>
+          </a:p>
+          <a:p>
+            <a:pPr lvl="1"/>
+            <a:r>
+              <a:rPr lang="en-US" dirty="0"/>
+              <a:t>Spitz and </a:t>
+            </a:r>
+            <a:r>
+              <a:rPr lang="en-US" dirty="0" err="1"/>
+              <a:t>Requicha</a:t>
+            </a:r>
+            <a:r>
+              <a:rPr lang="en-US" dirty="0"/>
+              <a:t>.</a:t>
+            </a:r>
+            <a:r>
+              <a:rPr lang="en-US" i="1" dirty="0"/>
+              <a:t> Multiple-Goals Path Planning for Coordinate Measuring Machines.</a:t>
+            </a:r>
+          </a:p>
+          <a:p>
+            <a:r>
+              <a:rPr lang="en-US" dirty="0"/>
+              <a:t>Machine Learning</a:t>
+            </a:r>
+          </a:p>
+          <a:p>
+            <a:pPr lvl="1"/>
+            <a:r>
+              <a:rPr lang="en-US" dirty="0"/>
+              <a:t>Arai et al. </a:t>
+            </a:r>
+            <a:r>
+              <a:rPr lang="en-US" i="1" dirty="0" err="1"/>
+              <a:t>Mutli</a:t>
+            </a:r>
+            <a:r>
+              <a:rPr lang="en-US" i="1" dirty="0"/>
+              <a:t>-agent Reinforcement learning for Planning and Scheduling Multiple Goals.</a:t>
+            </a:r>
+          </a:p>
+          <a:p>
+            <a:pPr lvl="1"/>
+            <a:r>
+              <a:rPr lang="en-US" dirty="0"/>
+              <a:t>Kawakami and Kakazu. </a:t>
+            </a:r>
+            <a:r>
+              <a:rPr lang="en-US" i="1" dirty="0"/>
+              <a:t>A Study on Robot Task Planning Problems in Multiagent Environments.</a:t>
+            </a:r>
+          </a:p>
+          <a:p>
+            <a:pPr lvl="1"/>
+            <a:endParaRPr lang="en-US" i="1" dirty="0"/>
+          </a:p>
+          <a:p>
+            <a:r>
+              <a:rPr lang="en-US" sz="1600" dirty="0"/>
+              <a:t>Other</a:t>
+            </a:r>
+          </a:p>
+          <a:p>
+            <a:pPr lvl="1"/>
+            <a:r>
+              <a:rPr lang="en-US" sz="1600" dirty="0" err="1"/>
+              <a:t>Kaelbling</a:t>
+            </a:r>
+            <a:r>
+              <a:rPr lang="en-US" sz="1600" dirty="0"/>
+              <a:t> and Lozano-Perez. </a:t>
+            </a:r>
+            <a:r>
+              <a:rPr lang="en-US" sz="1600" i="1" dirty="0"/>
+              <a:t>Hierarchical Task and Motion Planning in the Now.</a:t>
+            </a:r>
+          </a:p>
+          <a:p>
+            <a:pPr lvl="1"/>
+            <a:r>
+              <a:rPr lang="en-US" sz="1600" dirty="0" err="1"/>
+              <a:t>Wurm</a:t>
+            </a:r>
+            <a:r>
+              <a:rPr lang="en-US" sz="1600" dirty="0"/>
+              <a:t> et. al.</a:t>
+            </a:r>
+            <a:r>
+              <a:rPr lang="en-US" sz="1600" i="1" dirty="0"/>
+              <a:t> Coordinating heterogeneous teams of robots using temporal symbolic planning.</a:t>
+            </a:r>
+          </a:p>
+          <a:p>
+            <a:pPr lvl="1"/>
+            <a:r>
+              <a:rPr lang="en-US" sz="1600" dirty="0"/>
+              <a:t>Wang et al.</a:t>
+            </a:r>
+            <a:r>
+              <a:rPr lang="en-US" sz="1600" i="1" dirty="0"/>
+              <a:t> Hierarchical Task Planning for </a:t>
+            </a:r>
+            <a:r>
+              <a:rPr lang="en-US" sz="1600" i="1" dirty="0" err="1"/>
+              <a:t>Multiarm</a:t>
+            </a:r>
+            <a:r>
+              <a:rPr lang="en-US" sz="1600" i="1" dirty="0"/>
+              <a:t> Robot with </a:t>
+            </a:r>
+            <a:r>
+              <a:rPr lang="en-US" sz="1600" i="1" dirty="0" err="1"/>
+              <a:t>Multiconstraint</a:t>
+            </a:r>
+            <a:r>
+              <a:rPr lang="en-US" sz="1600" i="1" dirty="0"/>
+              <a:t>.</a:t>
+            </a:r>
           </a:p>
         </p:txBody>
       </p:sp>
@@ -4334,10 +4449,9 @@
           <a:lstStyle/>
           <a:p>
             <a:r>
-              <a:rPr lang="en-US" dirty="0" smtClean="0"/>
+              <a:rPr lang="en-US" dirty="0"/>
               <a:t>Approach</a:t>
             </a:r>
-            <a:endParaRPr lang="en-US" dirty="0"/>
           </a:p>
         </p:txBody>
       </p:sp>
@@ -4354,31 +4468,58 @@
         <p:spPr/>
         <p:txBody>
           <a:bodyPr>
-            <a:normAutofit/>
+            <a:normAutofit fontScale="92500" lnSpcReduction="10000"/>
           </a:bodyPr>
           <a:lstStyle/>
           <a:p>
             <a:r>
-              <a:rPr lang="en-US" dirty="0" smtClean="0"/>
-              <a:t>Create a simplified version of Overcooked as our test environment</a:t>
-            </a:r>
-          </a:p>
-          <a:p>
-            <a:r>
-              <a:rPr lang="en-US" dirty="0" smtClean="0"/>
-              <a:t>Use symbolic planning to have a single agent process single orders</a:t>
-            </a:r>
-          </a:p>
-          <a:p>
-            <a:r>
-              <a:rPr lang="en-US" dirty="0" smtClean="0"/>
-              <a:t>Create plans that satisfy multiple orders coming at different times, even when there are no outstanding orders</a:t>
-            </a:r>
-          </a:p>
-          <a:p>
-            <a:r>
-              <a:rPr lang="en-US" dirty="0" smtClean="0"/>
-              <a:t>Potential Extension: Run a centralized, multi-agent planner for at least 2 agents</a:t>
+              <a:rPr lang="en-US" sz="2800" dirty="0"/>
+              <a:t>Create a simplified version of Overcooked as our test environment (using Unity game engine).</a:t>
+            </a:r>
+          </a:p>
+          <a:p>
+            <a:r>
+              <a:rPr lang="en-US" sz="2800" dirty="0"/>
+              <a:t>Use symbolic planning to have a single agent process a single order.</a:t>
+            </a:r>
+          </a:p>
+          <a:p>
+            <a:r>
+              <a:rPr lang="en-US" sz="2800" dirty="0"/>
+              <a:t>Use waypoint planning to handle multiple orders at a time.</a:t>
+            </a:r>
+          </a:p>
+          <a:p>
+            <a:r>
+              <a:rPr lang="en-US" sz="2800" dirty="0"/>
+              <a:t>Online planning</a:t>
+            </a:r>
+          </a:p>
+          <a:p>
+            <a:pPr lvl="1"/>
+            <a:r>
+              <a:rPr lang="en-US" sz="2600" dirty="0"/>
+              <a:t>Handle orders coming in at different times</a:t>
+            </a:r>
+          </a:p>
+          <a:p>
+            <a:pPr lvl="1"/>
+            <a:r>
+              <a:rPr lang="en-US" sz="2600" dirty="0"/>
+              <a:t>Handle the case when there are no outstanding orders</a:t>
+            </a:r>
+          </a:p>
+          <a:p>
+            <a:pPr lvl="1"/>
+            <a:r>
+              <a:rPr lang="en-US" sz="2600" dirty="0"/>
+              <a:t>Handle free time during single orders</a:t>
+            </a:r>
+          </a:p>
+          <a:p>
+            <a:r>
+              <a:rPr lang="en-US" sz="2800" dirty="0"/>
+              <a:t>Potential Extension: Run a centralized, multi-agent planner for 2 agents</a:t>
             </a:r>
           </a:p>
         </p:txBody>
@@ -4424,10 +4565,9 @@
           <a:lstStyle/>
           <a:p>
             <a:r>
-              <a:rPr lang="en-US" dirty="0" smtClean="0"/>
+              <a:rPr lang="en-US" dirty="0"/>
               <a:t>Metrics of Success</a:t>
             </a:r>
-            <a:endParaRPr lang="en-US" dirty="0"/>
           </a:p>
         </p:txBody>
       </p:sp>
@@ -4447,22 +4587,42 @@
           <a:lstStyle/>
           <a:p>
             <a:r>
-              <a:rPr lang="en-US" dirty="0" smtClean="0"/>
+              <a:rPr lang="en-US" dirty="0"/>
               <a:t>Speed of computing viable plans</a:t>
             </a:r>
           </a:p>
           <a:p>
             <a:r>
-              <a:rPr lang="en-US" dirty="0" smtClean="0"/>
-              <a:t>Optimality of the plan. Is the planner able to come up with a better plan than a human player.</a:t>
-            </a:r>
-          </a:p>
-          <a:p>
-            <a:r>
-              <a:rPr lang="en-US" dirty="0" smtClean="0"/>
+              <a:rPr lang="en-US" dirty="0"/>
+              <a:t>Quality of the plan</a:t>
+            </a:r>
+          </a:p>
+          <a:p>
+            <a:pPr lvl="1"/>
+            <a:r>
+              <a:rPr lang="en-US" dirty="0"/>
+              <a:t>Look at reward earned</a:t>
+            </a:r>
+          </a:p>
+          <a:p>
+            <a:pPr lvl="1"/>
+            <a:r>
+              <a:rPr lang="en-US" dirty="0"/>
+              <a:t>Compared to optimal</a:t>
+            </a:r>
+          </a:p>
+          <a:p>
+            <a:pPr lvl="1"/>
+            <a:r>
+              <a:rPr lang="en-US" dirty="0"/>
+              <a:t>Compared to human players</a:t>
+            </a:r>
+          </a:p>
+          <a:p>
+            <a:r>
+              <a:rPr lang="en-US" dirty="0"/>
               <a:t>In the case of 2 agents, can the planner improve its score in a significant way</a:t>
             </a:r>
-            <a:endParaRPr lang="en-US" dirty="0"/>
           </a:p>
         </p:txBody>
       </p:sp>

</xml_diff>

<commit_message>
modified powerpoint for the presentation.
</commit_message>
<xml_diff>
--- a/Overcooked AI.pptx
+++ b/Overcooked AI.pptx
@@ -4,12 +4,16 @@
   <p:sldMasterIdLst>
     <p:sldMasterId id="2147483732" r:id="rId1"/>
   </p:sldMasterIdLst>
+  <p:notesMasterIdLst>
+    <p:notesMasterId r:id="rId8"/>
+  </p:notesMasterIdLst>
   <p:sldIdLst>
     <p:sldId id="256" r:id="rId2"/>
     <p:sldId id="257" r:id="rId3"/>
     <p:sldId id="258" r:id="rId4"/>
-    <p:sldId id="259" r:id="rId5"/>
-    <p:sldId id="260" r:id="rId6"/>
+    <p:sldId id="261" r:id="rId5"/>
+    <p:sldId id="259" r:id="rId6"/>
+    <p:sldId id="260" r:id="rId7"/>
   </p:sldIdLst>
   <p:sldSz cx="9144000" cy="6858000" type="screen4x3"/>
   <p:notesSz cx="6858000" cy="9144000"/>
@@ -131,6 +135,560 @@
 <p1510:revInfo xmlns:a="http://schemas.openxmlformats.org/drawingml/2006/main" xmlns:r="http://schemas.openxmlformats.org/officeDocument/2006/relationships" xmlns:p1510="http://schemas.microsoft.com/office/powerpoint/2015/10/main"/>
 </file>
 
+<file path=ppt/notesMasters/notesMaster1.xml><?xml version="1.0" encoding="utf-8"?>
+<p:notesMaster xmlns:a="http://schemas.openxmlformats.org/drawingml/2006/main" xmlns:r="http://schemas.openxmlformats.org/officeDocument/2006/relationships" xmlns:p="http://schemas.openxmlformats.org/presentationml/2006/main">
+  <p:cSld>
+    <p:bg>
+      <p:bgRef idx="1001">
+        <a:schemeClr val="bg1"/>
+      </p:bgRef>
+    </p:bg>
+    <p:spTree>
+      <p:nvGrpSpPr>
+        <p:cNvPr id="1" name=""/>
+        <p:cNvGrpSpPr/>
+        <p:nvPr/>
+      </p:nvGrpSpPr>
+      <p:grpSpPr>
+        <a:xfrm>
+          <a:off x="0" y="0"/>
+          <a:ext cx="0" cy="0"/>
+          <a:chOff x="0" y="0"/>
+          <a:chExt cx="0" cy="0"/>
+        </a:xfrm>
+      </p:grpSpPr>
+      <p:sp>
+        <p:nvSpPr>
+          <p:cNvPr id="2" name="Header Placeholder 1"/>
+          <p:cNvSpPr>
+            <a:spLocks noGrp="1"/>
+          </p:cNvSpPr>
+          <p:nvPr>
+            <p:ph type="hdr" sz="quarter"/>
+          </p:nvPr>
+        </p:nvSpPr>
+        <p:spPr>
+          <a:xfrm>
+            <a:off x="0" y="0"/>
+            <a:ext cx="2971800" cy="458788"/>
+          </a:xfrm>
+          <a:prstGeom prst="rect">
+            <a:avLst/>
+          </a:prstGeom>
+        </p:spPr>
+        <p:txBody>
+          <a:bodyPr vert="horz" lIns="91440" tIns="45720" rIns="91440" bIns="45720" rtlCol="0"/>
+          <a:lstStyle>
+            <a:lvl1pPr algn="l">
+              <a:defRPr sz="1200"/>
+            </a:lvl1pPr>
+          </a:lstStyle>
+          <a:p>
+            <a:endParaRPr lang="en-US"/>
+          </a:p>
+        </p:txBody>
+      </p:sp>
+      <p:sp>
+        <p:nvSpPr>
+          <p:cNvPr id="3" name="Date Placeholder 2"/>
+          <p:cNvSpPr>
+            <a:spLocks noGrp="1"/>
+          </p:cNvSpPr>
+          <p:nvPr>
+            <p:ph type="dt" idx="1"/>
+          </p:nvPr>
+        </p:nvSpPr>
+        <p:spPr>
+          <a:xfrm>
+            <a:off x="3884613" y="0"/>
+            <a:ext cx="2971800" cy="458788"/>
+          </a:xfrm>
+          <a:prstGeom prst="rect">
+            <a:avLst/>
+          </a:prstGeom>
+        </p:spPr>
+        <p:txBody>
+          <a:bodyPr vert="horz" lIns="91440" tIns="45720" rIns="91440" bIns="45720" rtlCol="0"/>
+          <a:lstStyle>
+            <a:lvl1pPr algn="r">
+              <a:defRPr sz="1200"/>
+            </a:lvl1pPr>
+          </a:lstStyle>
+          <a:p>
+            <a:fld id="{5E680B51-A60F-4B43-8340-B807B06FD66B}" type="datetimeFigureOut">
+              <a:rPr lang="en-US" smtClean="0"/>
+              <a:t>11/13/2017</a:t>
+            </a:fld>
+            <a:endParaRPr lang="en-US"/>
+          </a:p>
+        </p:txBody>
+      </p:sp>
+      <p:sp>
+        <p:nvSpPr>
+          <p:cNvPr id="4" name="Slide Image Placeholder 3"/>
+          <p:cNvSpPr>
+            <a:spLocks noGrp="1" noRot="1" noChangeAspect="1"/>
+          </p:cNvSpPr>
+          <p:nvPr>
+            <p:ph type="sldImg" idx="2"/>
+          </p:nvPr>
+        </p:nvSpPr>
+        <p:spPr>
+          <a:xfrm>
+            <a:off x="1371600" y="1143000"/>
+            <a:ext cx="4114800" cy="3086100"/>
+          </a:xfrm>
+          <a:prstGeom prst="rect">
+            <a:avLst/>
+          </a:prstGeom>
+          <a:noFill/>
+          <a:ln w="12700">
+            <a:solidFill>
+              <a:prstClr val="black"/>
+            </a:solidFill>
+          </a:ln>
+        </p:spPr>
+        <p:txBody>
+          <a:bodyPr vert="horz" lIns="91440" tIns="45720" rIns="91440" bIns="45720" rtlCol="0" anchor="ctr"/>
+          <a:lstStyle/>
+          <a:p>
+            <a:endParaRPr lang="en-US"/>
+          </a:p>
+        </p:txBody>
+      </p:sp>
+      <p:sp>
+        <p:nvSpPr>
+          <p:cNvPr id="5" name="Notes Placeholder 4"/>
+          <p:cNvSpPr>
+            <a:spLocks noGrp="1"/>
+          </p:cNvSpPr>
+          <p:nvPr>
+            <p:ph type="body" sz="quarter" idx="3"/>
+          </p:nvPr>
+        </p:nvSpPr>
+        <p:spPr>
+          <a:xfrm>
+            <a:off x="685800" y="4400550"/>
+            <a:ext cx="5486400" cy="3600450"/>
+          </a:xfrm>
+          <a:prstGeom prst="rect">
+            <a:avLst/>
+          </a:prstGeom>
+        </p:spPr>
+        <p:txBody>
+          <a:bodyPr vert="horz" lIns="91440" tIns="45720" rIns="91440" bIns="45720" rtlCol="0"/>
+          <a:lstStyle/>
+          <a:p>
+            <a:pPr lvl="0"/>
+            <a:r>
+              <a:rPr lang="en-US"/>
+              <a:t>Edit Master text styles</a:t>
+            </a:r>
+          </a:p>
+          <a:p>
+            <a:pPr lvl="1"/>
+            <a:r>
+              <a:rPr lang="en-US"/>
+              <a:t>Second level</a:t>
+            </a:r>
+          </a:p>
+          <a:p>
+            <a:pPr lvl="2"/>
+            <a:r>
+              <a:rPr lang="en-US"/>
+              <a:t>Third level</a:t>
+            </a:r>
+          </a:p>
+          <a:p>
+            <a:pPr lvl="3"/>
+            <a:r>
+              <a:rPr lang="en-US"/>
+              <a:t>Fourth level</a:t>
+            </a:r>
+          </a:p>
+          <a:p>
+            <a:pPr lvl="4"/>
+            <a:r>
+              <a:rPr lang="en-US"/>
+              <a:t>Fifth level</a:t>
+            </a:r>
+          </a:p>
+        </p:txBody>
+      </p:sp>
+      <p:sp>
+        <p:nvSpPr>
+          <p:cNvPr id="6" name="Footer Placeholder 5"/>
+          <p:cNvSpPr>
+            <a:spLocks noGrp="1"/>
+          </p:cNvSpPr>
+          <p:nvPr>
+            <p:ph type="ftr" sz="quarter" idx="4"/>
+          </p:nvPr>
+        </p:nvSpPr>
+        <p:spPr>
+          <a:xfrm>
+            <a:off x="0" y="8685213"/>
+            <a:ext cx="2971800" cy="458787"/>
+          </a:xfrm>
+          <a:prstGeom prst="rect">
+            <a:avLst/>
+          </a:prstGeom>
+        </p:spPr>
+        <p:txBody>
+          <a:bodyPr vert="horz" lIns="91440" tIns="45720" rIns="91440" bIns="45720" rtlCol="0" anchor="b"/>
+          <a:lstStyle>
+            <a:lvl1pPr algn="l">
+              <a:defRPr sz="1200"/>
+            </a:lvl1pPr>
+          </a:lstStyle>
+          <a:p>
+            <a:endParaRPr lang="en-US"/>
+          </a:p>
+        </p:txBody>
+      </p:sp>
+      <p:sp>
+        <p:nvSpPr>
+          <p:cNvPr id="7" name="Slide Number Placeholder 6"/>
+          <p:cNvSpPr>
+            <a:spLocks noGrp="1"/>
+          </p:cNvSpPr>
+          <p:nvPr>
+            <p:ph type="sldNum" sz="quarter" idx="5"/>
+          </p:nvPr>
+        </p:nvSpPr>
+        <p:spPr>
+          <a:xfrm>
+            <a:off x="3884613" y="8685213"/>
+            <a:ext cx="2971800" cy="458787"/>
+          </a:xfrm>
+          <a:prstGeom prst="rect">
+            <a:avLst/>
+          </a:prstGeom>
+        </p:spPr>
+        <p:txBody>
+          <a:bodyPr vert="horz" lIns="91440" tIns="45720" rIns="91440" bIns="45720" rtlCol="0" anchor="b"/>
+          <a:lstStyle>
+            <a:lvl1pPr algn="r">
+              <a:defRPr sz="1200"/>
+            </a:lvl1pPr>
+          </a:lstStyle>
+          <a:p>
+            <a:fld id="{EA301998-CB40-40EB-8113-83ED6DB2A2AE}" type="slidenum">
+              <a:rPr lang="en-US" smtClean="0"/>
+              <a:t>‹#›</a:t>
+            </a:fld>
+            <a:endParaRPr lang="en-US"/>
+          </a:p>
+        </p:txBody>
+      </p:sp>
+    </p:spTree>
+    <p:extLst>
+      <p:ext uri="{BB962C8B-B14F-4D97-AF65-F5344CB8AC3E}">
+        <p14:creationId xmlns:p14="http://schemas.microsoft.com/office/powerpoint/2010/main" val="4257450725"/>
+      </p:ext>
+    </p:extLst>
+  </p:cSld>
+  <p:clrMap bg1="lt1" tx1="dk1" bg2="lt2" tx2="dk2" accent1="accent1" accent2="accent2" accent3="accent3" accent4="accent4" accent5="accent5" accent6="accent6" hlink="hlink" folHlink="folHlink"/>
+  <p:notesStyle>
+    <a:lvl1pPr marL="0" algn="l" defTabSz="914400" rtl="0" eaLnBrk="1" latinLnBrk="0" hangingPunct="1">
+      <a:defRPr sz="1200" kern="1200">
+        <a:solidFill>
+          <a:schemeClr val="tx1"/>
+        </a:solidFill>
+        <a:latin typeface="+mn-lt"/>
+        <a:ea typeface="+mn-ea"/>
+        <a:cs typeface="+mn-cs"/>
+      </a:defRPr>
+    </a:lvl1pPr>
+    <a:lvl2pPr marL="457200" algn="l" defTabSz="914400" rtl="0" eaLnBrk="1" latinLnBrk="0" hangingPunct="1">
+      <a:defRPr sz="1200" kern="1200">
+        <a:solidFill>
+          <a:schemeClr val="tx1"/>
+        </a:solidFill>
+        <a:latin typeface="+mn-lt"/>
+        <a:ea typeface="+mn-ea"/>
+        <a:cs typeface="+mn-cs"/>
+      </a:defRPr>
+    </a:lvl2pPr>
+    <a:lvl3pPr marL="914400" algn="l" defTabSz="914400" rtl="0" eaLnBrk="1" latinLnBrk="0" hangingPunct="1">
+      <a:defRPr sz="1200" kern="1200">
+        <a:solidFill>
+          <a:schemeClr val="tx1"/>
+        </a:solidFill>
+        <a:latin typeface="+mn-lt"/>
+        <a:ea typeface="+mn-ea"/>
+        <a:cs typeface="+mn-cs"/>
+      </a:defRPr>
+    </a:lvl3pPr>
+    <a:lvl4pPr marL="1371600" algn="l" defTabSz="914400" rtl="0" eaLnBrk="1" latinLnBrk="0" hangingPunct="1">
+      <a:defRPr sz="1200" kern="1200">
+        <a:solidFill>
+          <a:schemeClr val="tx1"/>
+        </a:solidFill>
+        <a:latin typeface="+mn-lt"/>
+        <a:ea typeface="+mn-ea"/>
+        <a:cs typeface="+mn-cs"/>
+      </a:defRPr>
+    </a:lvl4pPr>
+    <a:lvl5pPr marL="1828800" algn="l" defTabSz="914400" rtl="0" eaLnBrk="1" latinLnBrk="0" hangingPunct="1">
+      <a:defRPr sz="1200" kern="1200">
+        <a:solidFill>
+          <a:schemeClr val="tx1"/>
+        </a:solidFill>
+        <a:latin typeface="+mn-lt"/>
+        <a:ea typeface="+mn-ea"/>
+        <a:cs typeface="+mn-cs"/>
+      </a:defRPr>
+    </a:lvl5pPr>
+    <a:lvl6pPr marL="2286000" algn="l" defTabSz="914400" rtl="0" eaLnBrk="1" latinLnBrk="0" hangingPunct="1">
+      <a:defRPr sz="1200" kern="1200">
+        <a:solidFill>
+          <a:schemeClr val="tx1"/>
+        </a:solidFill>
+        <a:latin typeface="+mn-lt"/>
+        <a:ea typeface="+mn-ea"/>
+        <a:cs typeface="+mn-cs"/>
+      </a:defRPr>
+    </a:lvl6pPr>
+    <a:lvl7pPr marL="2743200" algn="l" defTabSz="914400" rtl="0" eaLnBrk="1" latinLnBrk="0" hangingPunct="1">
+      <a:defRPr sz="1200" kern="1200">
+        <a:solidFill>
+          <a:schemeClr val="tx1"/>
+        </a:solidFill>
+        <a:latin typeface="+mn-lt"/>
+        <a:ea typeface="+mn-ea"/>
+        <a:cs typeface="+mn-cs"/>
+      </a:defRPr>
+    </a:lvl7pPr>
+    <a:lvl8pPr marL="3200400" algn="l" defTabSz="914400" rtl="0" eaLnBrk="1" latinLnBrk="0" hangingPunct="1">
+      <a:defRPr sz="1200" kern="1200">
+        <a:solidFill>
+          <a:schemeClr val="tx1"/>
+        </a:solidFill>
+        <a:latin typeface="+mn-lt"/>
+        <a:ea typeface="+mn-ea"/>
+        <a:cs typeface="+mn-cs"/>
+      </a:defRPr>
+    </a:lvl8pPr>
+    <a:lvl9pPr marL="3657600" algn="l" defTabSz="914400" rtl="0" eaLnBrk="1" latinLnBrk="0" hangingPunct="1">
+      <a:defRPr sz="1200" kern="1200">
+        <a:solidFill>
+          <a:schemeClr val="tx1"/>
+        </a:solidFill>
+        <a:latin typeface="+mn-lt"/>
+        <a:ea typeface="+mn-ea"/>
+        <a:cs typeface="+mn-cs"/>
+      </a:defRPr>
+    </a:lvl9pPr>
+  </p:notesStyle>
+</p:notesMaster>
+</file>
+
+<file path=ppt/notesSlides/notesSlide1.xml><?xml version="1.0" encoding="utf-8"?>
+<p:notes xmlns:a="http://schemas.openxmlformats.org/drawingml/2006/main" xmlns:r="http://schemas.openxmlformats.org/officeDocument/2006/relationships" xmlns:p="http://schemas.openxmlformats.org/presentationml/2006/main">
+  <p:cSld>
+    <p:spTree>
+      <p:nvGrpSpPr>
+        <p:cNvPr id="1" name=""/>
+        <p:cNvGrpSpPr/>
+        <p:nvPr/>
+      </p:nvGrpSpPr>
+      <p:grpSpPr>
+        <a:xfrm>
+          <a:off x="0" y="0"/>
+          <a:ext cx="0" cy="0"/>
+          <a:chOff x="0" y="0"/>
+          <a:chExt cx="0" cy="0"/>
+        </a:xfrm>
+      </p:grpSpPr>
+      <p:sp>
+        <p:nvSpPr>
+          <p:cNvPr id="2" name="Slide Image Placeholder 1"/>
+          <p:cNvSpPr>
+            <a:spLocks noGrp="1" noRot="1" noChangeAspect="1"/>
+          </p:cNvSpPr>
+          <p:nvPr>
+            <p:ph type="sldImg"/>
+          </p:nvPr>
+        </p:nvSpPr>
+        <p:spPr/>
+      </p:sp>
+      <p:sp>
+        <p:nvSpPr>
+          <p:cNvPr id="3" name="Notes Placeholder 2"/>
+          <p:cNvSpPr>
+            <a:spLocks noGrp="1"/>
+          </p:cNvSpPr>
+          <p:nvPr>
+            <p:ph type="body" idx="1"/>
+          </p:nvPr>
+        </p:nvSpPr>
+        <p:spPr/>
+        <p:txBody>
+          <a:bodyPr/>
+          <a:lstStyle/>
+          <a:p>
+            <a:r>
+              <a:rPr lang="en-US" dirty="0"/>
+              <a:t>Overcooked = common planning problems</a:t>
+            </a:r>
+          </a:p>
+          <a:p>
+            <a:r>
+              <a:rPr lang="en-US" dirty="0"/>
+              <a:t>Single-agent task</a:t>
+            </a:r>
+          </a:p>
+          <a:p>
+            <a:pPr marL="171450" indent="-171450">
+              <a:buFont typeface="Arial" panose="020B0604020202020204" pitchFamily="34" charset="0"/>
+              <a:buChar char="•"/>
+            </a:pPr>
+            <a:r>
+              <a:rPr lang="en-US" dirty="0"/>
+              <a:t>Order preparing ingredients for multiple goal recipes</a:t>
+            </a:r>
+          </a:p>
+          <a:p>
+            <a:pPr marL="171450" indent="-171450">
+              <a:buFont typeface="Arial" panose="020B0604020202020204" pitchFamily="34" charset="0"/>
+              <a:buChar char="•"/>
+            </a:pPr>
+            <a:r>
+              <a:rPr lang="en-US" dirty="0"/>
+              <a:t>Navigate kitchen</a:t>
+            </a:r>
+          </a:p>
+          <a:p>
+            <a:pPr marL="0" indent="0">
+              <a:buFont typeface="Arial" panose="020B0604020202020204" pitchFamily="34" charset="0"/>
+              <a:buNone/>
+            </a:pPr>
+            <a:r>
+              <a:rPr lang="en-US" dirty="0"/>
+              <a:t>We see task planning in hierarchical planning</a:t>
+            </a:r>
+          </a:p>
+          <a:p>
+            <a:pPr marL="0" indent="0">
+              <a:buFont typeface="Arial" panose="020B0604020202020204" pitchFamily="34" charset="0"/>
+              <a:buNone/>
+            </a:pPr>
+            <a:r>
+              <a:rPr lang="en-US" dirty="0"/>
+              <a:t>And multiple goal planning in </a:t>
+            </a:r>
+            <a:r>
+              <a:rPr lang="en-US" dirty="0" err="1"/>
+              <a:t>surveyal</a:t>
+            </a:r>
+            <a:endParaRPr lang="en-US" dirty="0"/>
+          </a:p>
+          <a:p>
+            <a:pPr marL="171450" indent="-171450">
+              <a:buFont typeface="Arial" panose="020B0604020202020204" pitchFamily="34" charset="0"/>
+              <a:buChar char="•"/>
+            </a:pPr>
+            <a:endParaRPr lang="en-US" dirty="0"/>
+          </a:p>
+          <a:p>
+            <a:pPr marL="0" indent="0">
+              <a:buFont typeface="Arial" panose="020B0604020202020204" pitchFamily="34" charset="0"/>
+              <a:buNone/>
+            </a:pPr>
+            <a:r>
+              <a:rPr lang="en-US" dirty="0"/>
+              <a:t>Multi-agent</a:t>
+            </a:r>
+          </a:p>
+          <a:p>
+            <a:pPr marL="0" indent="0">
+              <a:buFont typeface="Arial" panose="020B0604020202020204" pitchFamily="34" charset="0"/>
+              <a:buNone/>
+            </a:pPr>
+            <a:r>
+              <a:rPr lang="en-US" dirty="0"/>
+              <a:t>Not our project</a:t>
+            </a:r>
+          </a:p>
+          <a:p>
+            <a:pPr marL="171450" indent="-171450">
+              <a:buFont typeface="Arial" panose="020B0604020202020204" pitchFamily="34" charset="0"/>
+              <a:buChar char="•"/>
+            </a:pPr>
+            <a:r>
+              <a:rPr lang="en-US" dirty="0"/>
+              <a:t>Reinforcement approaches</a:t>
+            </a:r>
+          </a:p>
+          <a:p>
+            <a:pPr marL="171450" indent="-171450">
+              <a:buFont typeface="Arial" panose="020B0604020202020204" pitchFamily="34" charset="0"/>
+              <a:buChar char="•"/>
+            </a:pPr>
+            <a:r>
+              <a:rPr lang="en-US" dirty="0"/>
+              <a:t>Optimal assignment of tasks</a:t>
+            </a:r>
+          </a:p>
+          <a:p>
+            <a:pPr marL="171450" indent="-171450">
+              <a:buFont typeface="Arial" panose="020B0604020202020204" pitchFamily="34" charset="0"/>
+              <a:buChar char="•"/>
+            </a:pPr>
+            <a:r>
+              <a:rPr lang="en-US" dirty="0"/>
+              <a:t>Robots of differing capabilities</a:t>
+            </a:r>
+          </a:p>
+          <a:p>
+            <a:pPr marL="171450" indent="-171450">
+              <a:buFont typeface="Arial" panose="020B0604020202020204" pitchFamily="34" charset="0"/>
+              <a:buChar char="•"/>
+            </a:pPr>
+            <a:r>
+              <a:rPr lang="en-US" dirty="0"/>
+              <a:t>Case studies in space</a:t>
+            </a:r>
+          </a:p>
+        </p:txBody>
+      </p:sp>
+      <p:sp>
+        <p:nvSpPr>
+          <p:cNvPr id="4" name="Slide Number Placeholder 3"/>
+          <p:cNvSpPr>
+            <a:spLocks noGrp="1"/>
+          </p:cNvSpPr>
+          <p:nvPr>
+            <p:ph type="sldNum" sz="quarter" idx="10"/>
+          </p:nvPr>
+        </p:nvSpPr>
+        <p:spPr/>
+        <p:txBody>
+          <a:bodyPr/>
+          <a:lstStyle/>
+          <a:p>
+            <a:fld id="{EA301998-CB40-40EB-8113-83ED6DB2A2AE}" type="slidenum">
+              <a:rPr lang="en-US" smtClean="0"/>
+              <a:t>3</a:t>
+            </a:fld>
+            <a:endParaRPr lang="en-US"/>
+          </a:p>
+        </p:txBody>
+      </p:sp>
+    </p:spTree>
+    <p:extLst>
+      <p:ext uri="{BB962C8B-B14F-4D97-AF65-F5344CB8AC3E}">
+        <p14:creationId xmlns:p14="http://schemas.microsoft.com/office/powerpoint/2010/main" val="403292912"/>
+      </p:ext>
+    </p:extLst>
+  </p:cSld>
+  <p:clrMapOvr>
+    <a:masterClrMapping/>
+  </p:clrMapOvr>
+</p:notes>
+</file>
+
 <file path=ppt/slideLayouts/slideLayout1.xml><?xml version="1.0" encoding="utf-8"?>
 <p:sldLayout xmlns:a="http://schemas.openxmlformats.org/drawingml/2006/main" xmlns:r="http://schemas.openxmlformats.org/officeDocument/2006/relationships" xmlns:p="http://schemas.openxmlformats.org/presentationml/2006/main" showMasterSp="0" type="title" preserve="1">
   <p:cSld name="Title Slide">
@@ -324,7 +882,7 @@
           <a:p>
             <a:fld id="{297A39A9-956E-43ED-949C-650B51C5AC44}" type="datetimeFigureOut">
               <a:rPr lang="en-US" smtClean="0"/>
-              <a:t>11/12/2017</a:t>
+              <a:t>11/13/2017</a:t>
             </a:fld>
             <a:endParaRPr lang="en-US"/>
           </a:p>
@@ -675,7 +1233,7 @@
           <a:p>
             <a:fld id="{297A39A9-956E-43ED-949C-650B51C5AC44}" type="datetimeFigureOut">
               <a:rPr lang="en-US" smtClean="0"/>
-              <a:t>11/12/2017</a:t>
+              <a:t>11/13/2017</a:t>
             </a:fld>
             <a:endParaRPr lang="en-US"/>
           </a:p>
@@ -849,7 +1407,7 @@
           <a:p>
             <a:fld id="{297A39A9-956E-43ED-949C-650B51C5AC44}" type="datetimeFigureOut">
               <a:rPr lang="en-US" smtClean="0"/>
-              <a:t>11/12/2017</a:t>
+              <a:t>11/13/2017</a:t>
             </a:fld>
             <a:endParaRPr lang="en-US"/>
           </a:p>
@@ -961,7 +1519,7 @@
           <a:p>
             <a:fld id="{297A39A9-956E-43ED-949C-650B51C5AC44}" type="datetimeFigureOut">
               <a:rPr lang="en-US" smtClean="0"/>
-              <a:t>11/12/2017</a:t>
+              <a:t>11/13/2017</a:t>
             </a:fld>
             <a:endParaRPr lang="en-US"/>
           </a:p>
@@ -1318,7 +1876,7 @@
           <a:p>
             <a:fld id="{297A39A9-956E-43ED-949C-650B51C5AC44}" type="datetimeFigureOut">
               <a:rPr lang="en-US" smtClean="0"/>
-              <a:t>11/12/2017</a:t>
+              <a:t>11/13/2017</a:t>
             </a:fld>
             <a:endParaRPr lang="en-US"/>
           </a:p>
@@ -1582,7 +2140,7 @@
           <a:p>
             <a:fld id="{297A39A9-956E-43ED-949C-650B51C5AC44}" type="datetimeFigureOut">
               <a:rPr lang="en-US" smtClean="0"/>
-              <a:t>11/12/2017</a:t>
+              <a:t>11/13/2017</a:t>
             </a:fld>
             <a:endParaRPr lang="en-US"/>
           </a:p>
@@ -1943,7 +2501,7 @@
           <a:p>
             <a:fld id="{297A39A9-956E-43ED-949C-650B51C5AC44}" type="datetimeFigureOut">
               <a:rPr lang="en-US" smtClean="0"/>
-              <a:t>11/12/2017</a:t>
+              <a:t>11/13/2017</a:t>
             </a:fld>
             <a:endParaRPr lang="en-US"/>
           </a:p>
@@ -2169,7 +2727,7 @@
           <a:p>
             <a:fld id="{297A39A9-956E-43ED-949C-650B51C5AC44}" type="datetimeFigureOut">
               <a:rPr lang="en-US" smtClean="0"/>
-              <a:t>11/12/2017</a:t>
+              <a:t>11/13/2017</a:t>
             </a:fld>
             <a:endParaRPr lang="en-US"/>
           </a:p>
@@ -2259,7 +2817,7 @@
           <a:p>
             <a:fld id="{297A39A9-956E-43ED-949C-650B51C5AC44}" type="datetimeFigureOut">
               <a:rPr lang="en-US" smtClean="0"/>
-              <a:t>11/12/2017</a:t>
+              <a:t>11/13/2017</a:t>
             </a:fld>
             <a:endParaRPr lang="en-US"/>
           </a:p>
@@ -2525,7 +3083,7 @@
           <a:p>
             <a:fld id="{297A39A9-956E-43ED-949C-650B51C5AC44}" type="datetimeFigureOut">
               <a:rPr lang="en-US" smtClean="0"/>
-              <a:t>11/12/2017</a:t>
+              <a:t>11/13/2017</a:t>
             </a:fld>
             <a:endParaRPr lang="en-US"/>
           </a:p>
@@ -2752,7 +3310,7 @@
           <a:p>
             <a:fld id="{297A39A9-956E-43ED-949C-650B51C5AC44}" type="datetimeFigureOut">
               <a:rPr lang="en-US" smtClean="0"/>
-              <a:t>11/12/2017</a:t>
+              <a:t>11/13/2017</a:t>
             </a:fld>
             <a:endParaRPr lang="en-US"/>
           </a:p>
@@ -3249,7 +3807,7 @@
           <a:p>
             <a:fld id="{297A39A9-956E-43ED-949C-650B51C5AC44}" type="datetimeFigureOut">
               <a:rPr lang="en-US" smtClean="0"/>
-              <a:t>11/12/2017</a:t>
+              <a:t>11/13/2017</a:t>
             </a:fld>
             <a:endParaRPr lang="en-US"/>
           </a:p>
@@ -4264,13 +4822,83 @@
         <p:spPr/>
         <p:txBody>
           <a:bodyPr>
-            <a:normAutofit fontScale="92500" lnSpcReduction="20000"/>
+            <a:normAutofit fontScale="85000" lnSpcReduction="10000"/>
           </a:bodyPr>
           <a:lstStyle/>
           <a:p>
             <a:r>
               <a:rPr lang="en-US" dirty="0"/>
-              <a:t>Graph Planning</a:t>
+              <a:t>Single-agent Task Planning</a:t>
+            </a:r>
+          </a:p>
+          <a:p>
+            <a:pPr lvl="1"/>
+            <a:r>
+              <a:rPr lang="en-US" dirty="0" err="1"/>
+              <a:t>Kaelbling</a:t>
+            </a:r>
+            <a:r>
+              <a:rPr lang="en-US" dirty="0"/>
+              <a:t> and Lozano-Perez. </a:t>
+            </a:r>
+            <a:r>
+              <a:rPr lang="en-US" i="1" dirty="0"/>
+              <a:t>Hierarchical Task and Motion Planning in the Now.</a:t>
+            </a:r>
+          </a:p>
+          <a:p>
+            <a:pPr lvl="1"/>
+            <a:r>
+              <a:rPr lang="en-US" dirty="0"/>
+              <a:t>Spitz and </a:t>
+            </a:r>
+            <a:r>
+              <a:rPr lang="en-US" dirty="0" err="1"/>
+              <a:t>Requicha</a:t>
+            </a:r>
+            <a:r>
+              <a:rPr lang="en-US" dirty="0"/>
+              <a:t>.</a:t>
+            </a:r>
+            <a:r>
+              <a:rPr lang="en-US" i="1" dirty="0"/>
+              <a:t> Multiple-Goals Path Planning for Coordinate Measuring Machines.</a:t>
+            </a:r>
+          </a:p>
+          <a:p>
+            <a:pPr lvl="1"/>
+            <a:endParaRPr lang="en-US" i="1" dirty="0"/>
+          </a:p>
+          <a:p>
+            <a:r>
+              <a:rPr lang="en-US" dirty="0"/>
+              <a:t>Multi-agent Works</a:t>
+            </a:r>
+          </a:p>
+          <a:p>
+            <a:pPr lvl="1"/>
+            <a:r>
+              <a:rPr lang="en-US" dirty="0"/>
+              <a:t>Arai et al. </a:t>
+            </a:r>
+            <a:r>
+              <a:rPr lang="en-US" i="1" dirty="0" err="1"/>
+              <a:t>Mutli</a:t>
+            </a:r>
+            <a:r>
+              <a:rPr lang="en-US" i="1" dirty="0"/>
+              <a:t>-agent Reinforcement learning for Planning and Scheduling Multiple Goals.</a:t>
+            </a:r>
+          </a:p>
+          <a:p>
+            <a:pPr lvl="1"/>
+            <a:r>
+              <a:rPr lang="en-US" dirty="0"/>
+              <a:t>Kawakami and Kakazu. </a:t>
+            </a:r>
+            <a:r>
+              <a:rPr lang="en-US" i="1" dirty="0"/>
+              <a:t>A Study on Robot Task Planning Problems in Multiagent Environments.</a:t>
             </a:r>
           </a:p>
           <a:p>
@@ -4287,122 +4915,47 @@
               <a:rPr lang="en-US" i="1" dirty="0"/>
               <a:t>Task Decomposition and Plan Generation in Multiagent Domains.</a:t>
             </a:r>
+            <a:endParaRPr lang="en-US" dirty="0"/>
           </a:p>
           <a:p>
             <a:pPr lvl="1"/>
             <a:r>
+              <a:rPr lang="en-US" dirty="0" err="1"/>
+              <a:t>Wurm</a:t>
+            </a:r>
+            <a:r>
               <a:rPr lang="en-US" dirty="0"/>
-              <a:t>Spitz and </a:t>
-            </a:r>
-            <a:r>
-              <a:rPr lang="en-US" dirty="0" err="1"/>
-              <a:t>Requicha</a:t>
-            </a:r>
+              <a:t> et. al.</a:t>
+            </a:r>
+            <a:r>
+              <a:rPr lang="en-US" i="1" dirty="0"/>
+              <a:t> Coordinating heterogeneous teams of robots using temporal symbolic planning.</a:t>
+            </a:r>
+          </a:p>
+          <a:p>
+            <a:pPr lvl="1"/>
             <a:r>
               <a:rPr lang="en-US" dirty="0"/>
-              <a:t>.</a:t>
+              <a:t>Wang et al.</a:t>
             </a:r>
             <a:r>
               <a:rPr lang="en-US" i="1" dirty="0"/>
-              <a:t> Multiple-Goals Path Planning for Coordinate Measuring Machines.</a:t>
-            </a:r>
-          </a:p>
-          <a:p>
-            <a:r>
-              <a:rPr lang="en-US" dirty="0"/>
-              <a:t>Machine Learning</a:t>
-            </a:r>
-          </a:p>
-          <a:p>
-            <a:pPr lvl="1"/>
-            <a:r>
-              <a:rPr lang="en-US" dirty="0"/>
-              <a:t>Arai et al. </a:t>
+              <a:t> Hierarchical Task Planning for </a:t>
             </a:r>
             <a:r>
               <a:rPr lang="en-US" i="1" dirty="0" err="1"/>
-              <a:t>Mutli</a:t>
+              <a:t>Multiarm</a:t>
             </a:r>
             <a:r>
               <a:rPr lang="en-US" i="1" dirty="0"/>
-              <a:t>-agent Reinforcement learning for Planning and Scheduling Multiple Goals.</a:t>
-            </a:r>
-          </a:p>
-          <a:p>
-            <a:pPr lvl="1"/>
-            <a:r>
-              <a:rPr lang="en-US" dirty="0"/>
-              <a:t>Kawakami and Kakazu. </a:t>
+              <a:t> Robot with </a:t>
+            </a:r>
+            <a:r>
+              <a:rPr lang="en-US" i="1" dirty="0" err="1"/>
+              <a:t>Multiconstraint</a:t>
             </a:r>
             <a:r>
               <a:rPr lang="en-US" i="1" dirty="0"/>
-              <a:t>A Study on Robot Task Planning Problems in Multiagent Environments.</a:t>
-            </a:r>
-          </a:p>
-          <a:p>
-            <a:pPr lvl="1"/>
-            <a:endParaRPr lang="en-US" i="1" dirty="0"/>
-          </a:p>
-          <a:p>
-            <a:r>
-              <a:rPr lang="en-US" sz="1600" dirty="0"/>
-              <a:t>Other</a:t>
-            </a:r>
-          </a:p>
-          <a:p>
-            <a:pPr lvl="1"/>
-            <a:r>
-              <a:rPr lang="en-US" sz="1600" dirty="0" err="1"/>
-              <a:t>Kaelbling</a:t>
-            </a:r>
-            <a:r>
-              <a:rPr lang="en-US" sz="1600" dirty="0"/>
-              <a:t> and Lozano-Perez. </a:t>
-            </a:r>
-            <a:r>
-              <a:rPr lang="en-US" sz="1600" i="1" dirty="0"/>
-              <a:t>Hierarchical Task and Motion Planning in the Now.</a:t>
-            </a:r>
-          </a:p>
-          <a:p>
-            <a:pPr lvl="1"/>
-            <a:r>
-              <a:rPr lang="en-US" sz="1600" dirty="0" err="1"/>
-              <a:t>Wurm</a:t>
-            </a:r>
-            <a:r>
-              <a:rPr lang="en-US" sz="1600" dirty="0"/>
-              <a:t> et. al.</a:t>
-            </a:r>
-            <a:r>
-              <a:rPr lang="en-US" sz="1600" i="1" dirty="0"/>
-              <a:t> Coordinating heterogeneous teams of robots using temporal symbolic planning.</a:t>
-            </a:r>
-          </a:p>
-          <a:p>
-            <a:pPr lvl="1"/>
-            <a:r>
-              <a:rPr lang="en-US" sz="1600" dirty="0"/>
-              <a:t>Wang et al.</a:t>
-            </a:r>
-            <a:r>
-              <a:rPr lang="en-US" sz="1600" i="1" dirty="0"/>
-              <a:t> Hierarchical Task Planning for </a:t>
-            </a:r>
-            <a:r>
-              <a:rPr lang="en-US" sz="1600" i="1" dirty="0" err="1"/>
-              <a:t>Multiarm</a:t>
-            </a:r>
-            <a:r>
-              <a:rPr lang="en-US" sz="1600" i="1" dirty="0"/>
-              <a:t> Robot with </a:t>
-            </a:r>
-            <a:r>
-              <a:rPr lang="en-US" sz="1600" i="1" dirty="0" err="1"/>
-              <a:t>Multiconstraint</a:t>
-            </a:r>
-            <a:r>
-              <a:rPr lang="en-US" sz="1600" i="1" dirty="0"/>
               <a:t>.</a:t>
             </a:r>
           </a:p>
@@ -4435,6 +4988,170 @@
       </p:grpSpPr>
       <p:sp>
         <p:nvSpPr>
+          <p:cNvPr id="2" name="Title 1">
+            <a:extLst>
+              <a:ext uri="{FF2B5EF4-FFF2-40B4-BE49-F238E27FC236}">
+                <a16:creationId xmlns:a16="http://schemas.microsoft.com/office/drawing/2014/main" id="{D7EA26F8-2DAE-493F-8EEF-DB5F7AE8B581}"/>
+              </a:ext>
+            </a:extLst>
+          </p:cNvPr>
+          <p:cNvSpPr>
+            <a:spLocks noGrp="1"/>
+          </p:cNvSpPr>
+          <p:nvPr>
+            <p:ph type="title"/>
+          </p:nvPr>
+        </p:nvSpPr>
+        <p:spPr/>
+        <p:txBody>
+          <a:bodyPr/>
+          <a:lstStyle/>
+          <a:p>
+            <a:r>
+              <a:rPr lang="en-US" dirty="0"/>
+              <a:t>Planning Representation</a:t>
+            </a:r>
+          </a:p>
+        </p:txBody>
+      </p:sp>
+      <p:sp>
+        <p:nvSpPr>
+          <p:cNvPr id="3" name="Content Placeholder 2">
+            <a:extLst>
+              <a:ext uri="{FF2B5EF4-FFF2-40B4-BE49-F238E27FC236}">
+                <a16:creationId xmlns:a16="http://schemas.microsoft.com/office/drawing/2014/main" id="{07C11474-4789-4213-B783-1BD7126DECA9}"/>
+              </a:ext>
+            </a:extLst>
+          </p:cNvPr>
+          <p:cNvSpPr>
+            <a:spLocks noGrp="1"/>
+          </p:cNvSpPr>
+          <p:nvPr>
+            <p:ph sz="quarter" idx="1"/>
+          </p:nvPr>
+        </p:nvSpPr>
+        <p:spPr/>
+        <p:txBody>
+          <a:bodyPr>
+            <a:normAutofit/>
+          </a:bodyPr>
+          <a:lstStyle/>
+          <a:p>
+            <a:r>
+              <a:rPr lang="en-US" dirty="0"/>
+              <a:t>Symbolic planning</a:t>
+            </a:r>
+          </a:p>
+          <a:p>
+            <a:r>
+              <a:rPr lang="en-US" dirty="0"/>
+              <a:t>Game State</a:t>
+            </a:r>
+          </a:p>
+          <a:p>
+            <a:pPr lvl="1"/>
+            <a:r>
+              <a:rPr lang="en-US" dirty="0"/>
+              <a:t>State of ingredients (Onions, tomatoes, mushrooms)</a:t>
+            </a:r>
+          </a:p>
+          <a:p>
+            <a:pPr lvl="1"/>
+            <a:r>
+              <a:rPr lang="en-US" dirty="0"/>
+              <a:t>State of kitchenware (cutting board, pots, plates)</a:t>
+            </a:r>
+          </a:p>
+          <a:p>
+            <a:pPr lvl="1"/>
+            <a:r>
+              <a:rPr lang="en-US" dirty="0"/>
+              <a:t>etc...</a:t>
+            </a:r>
+          </a:p>
+          <a:p>
+            <a:r>
+              <a:rPr lang="en-US" dirty="0"/>
+              <a:t>Transitions: player actions</a:t>
+            </a:r>
+          </a:p>
+          <a:p>
+            <a:pPr lvl="1"/>
+            <a:r>
+              <a:rPr lang="en-US" dirty="0"/>
+              <a:t>Chop up ingredient </a:t>
+            </a:r>
+            <a:r>
+              <a:rPr lang="en-US" i="1" dirty="0"/>
+              <a:t>x</a:t>
+            </a:r>
+            <a:endParaRPr lang="en-US" dirty="0"/>
+          </a:p>
+          <a:p>
+            <a:pPr lvl="1"/>
+            <a:r>
+              <a:rPr lang="en-US" dirty="0"/>
+              <a:t>Add ingredient </a:t>
+            </a:r>
+            <a:r>
+              <a:rPr lang="en-US" i="1" dirty="0"/>
+              <a:t>x </a:t>
+            </a:r>
+            <a:r>
+              <a:rPr lang="en-US" dirty="0"/>
+              <a:t>to pot </a:t>
+            </a:r>
+            <a:r>
+              <a:rPr lang="en-US" i="1" dirty="0"/>
+              <a:t>y</a:t>
+            </a:r>
+          </a:p>
+          <a:p>
+            <a:r>
+              <a:rPr lang="en-US" dirty="0"/>
+              <a:t>Goal states: recipe is completed</a:t>
+            </a:r>
+          </a:p>
+          <a:p>
+            <a:r>
+              <a:rPr lang="en-US" dirty="0"/>
+              <a:t>Cost: time steps vs reward earned</a:t>
+            </a:r>
+          </a:p>
+        </p:txBody>
+      </p:sp>
+    </p:spTree>
+    <p:extLst>
+      <p:ext uri="{BB962C8B-B14F-4D97-AF65-F5344CB8AC3E}">
+        <p14:creationId xmlns:p14="http://schemas.microsoft.com/office/powerpoint/2010/main" val="2608092377"/>
+      </p:ext>
+    </p:extLst>
+  </p:cSld>
+  <p:clrMapOvr>
+    <a:masterClrMapping/>
+  </p:clrMapOvr>
+</p:sld>
+</file>
+
+<file path=ppt/slides/slide5.xml><?xml version="1.0" encoding="utf-8"?>
+<p:sld xmlns:a="http://schemas.openxmlformats.org/drawingml/2006/main" xmlns:r="http://schemas.openxmlformats.org/officeDocument/2006/relationships" xmlns:p="http://schemas.openxmlformats.org/presentationml/2006/main">
+  <p:cSld>
+    <p:spTree>
+      <p:nvGrpSpPr>
+        <p:cNvPr id="1" name=""/>
+        <p:cNvGrpSpPr/>
+        <p:nvPr/>
+      </p:nvGrpSpPr>
+      <p:grpSpPr>
+        <a:xfrm>
+          <a:off x="0" y="0"/>
+          <a:ext cx="0" cy="0"/>
+          <a:chOff x="0" y="0"/>
+          <a:chExt cx="0" cy="0"/>
+        </a:xfrm>
+      </p:grpSpPr>
+      <p:sp>
+        <p:nvSpPr>
           <p:cNvPr id="2" name="Title 1"/>
           <p:cNvSpPr>
             <a:spLocks noGrp="1"/>
@@ -4468,7 +5185,7 @@
         <p:spPr/>
         <p:txBody>
           <a:bodyPr>
-            <a:normAutofit fontScale="92500" lnSpcReduction="10000"/>
+            <a:normAutofit fontScale="92500"/>
           </a:bodyPr>
           <a:lstStyle/>
           <a:p>
@@ -4510,15 +5227,8 @@
             </a:r>
           </a:p>
           <a:p>
-            <a:pPr lvl="1"/>
-            <a:r>
-              <a:rPr lang="en-US" sz="2600" dirty="0"/>
-              <a:t>Handle free time during single orders</a:t>
-            </a:r>
-          </a:p>
-          <a:p>
-            <a:r>
-              <a:rPr lang="en-US" sz="2800" dirty="0"/>
+            <a:r>
+              <a:rPr lang="en-US" sz="3000" dirty="0"/>
               <a:t>Potential Extension: Run a centralized, multi-agent planner for 2 agents</a:t>
             </a:r>
           </a:p>
@@ -4532,7 +5242,7 @@
 </p:sld>
 </file>
 
-<file path=ppt/slides/slide5.xml><?xml version="1.0" encoding="utf-8"?>
+<file path=ppt/slides/slide6.xml><?xml version="1.0" encoding="utf-8"?>
 <p:sld xmlns:a="http://schemas.openxmlformats.org/drawingml/2006/main" xmlns:r="http://schemas.openxmlformats.org/officeDocument/2006/relationships" xmlns:p="http://schemas.openxmlformats.org/presentationml/2006/main">
   <p:cSld>
     <p:spTree>
@@ -4902,4 +5612,299 @@
   <a:objectDefaults/>
   <a:extraClrSchemeLst/>
 </a:theme>
+</file>
+
+<file path=ppt/theme/theme2.xml><?xml version="1.0" encoding="utf-8"?>
+<a:theme xmlns:a="http://schemas.openxmlformats.org/drawingml/2006/main" name="Office Theme">
+  <a:themeElements>
+    <a:clrScheme name="Office">
+      <a:dk1>
+        <a:sysClr val="windowText" lastClr="000000"/>
+      </a:dk1>
+      <a:lt1>
+        <a:sysClr val="window" lastClr="FFFFFF"/>
+      </a:lt1>
+      <a:dk2>
+        <a:srgbClr val="44546A"/>
+      </a:dk2>
+      <a:lt2>
+        <a:srgbClr val="E7E6E6"/>
+      </a:lt2>
+      <a:accent1>
+        <a:srgbClr val="4472C4"/>
+      </a:accent1>
+      <a:accent2>
+        <a:srgbClr val="ED7D31"/>
+      </a:accent2>
+      <a:accent3>
+        <a:srgbClr val="A5A5A5"/>
+      </a:accent3>
+      <a:accent4>
+        <a:srgbClr val="FFC000"/>
+      </a:accent4>
+      <a:accent5>
+        <a:srgbClr val="5B9BD5"/>
+      </a:accent5>
+      <a:accent6>
+        <a:srgbClr val="70AD47"/>
+      </a:accent6>
+      <a:hlink>
+        <a:srgbClr val="0563C1"/>
+      </a:hlink>
+      <a:folHlink>
+        <a:srgbClr val="954F72"/>
+      </a:folHlink>
+    </a:clrScheme>
+    <a:fontScheme name="Office">
+      <a:majorFont>
+        <a:latin typeface="Calibri Light" panose="020F0302020204030204"/>
+        <a:ea typeface=""/>
+        <a:cs typeface=""/>
+        <a:font script="Jpan" typeface="游ゴシック Light"/>
+        <a:font script="Hang" typeface="맑은 고딕"/>
+        <a:font script="Hans" typeface="等线 Light"/>
+        <a:font script="Hant" typeface="新細明體"/>
+        <a:font script="Arab" typeface="Times New Roman"/>
+        <a:font script="Hebr" typeface="Times New Roman"/>
+        <a:font script="Thai" typeface="Angsana New"/>
+        <a:font script="Ethi" typeface="Nyala"/>
+        <a:font script="Beng" typeface="Vrinda"/>
+        <a:font script="Gujr" typeface="Shruti"/>
+        <a:font script="Khmr" typeface="MoolBoran"/>
+        <a:font script="Knda" typeface="Tunga"/>
+        <a:font script="Guru" typeface="Raavi"/>
+        <a:font script="Cans" typeface="Euphemia"/>
+        <a:font script="Cher" typeface="Plantagenet Cherokee"/>
+        <a:font script="Yiii" typeface="Microsoft Yi Baiti"/>
+        <a:font script="Tibt" typeface="Microsoft Himalaya"/>
+        <a:font script="Thaa" typeface="MV Boli"/>
+        <a:font script="Deva" typeface="Mangal"/>
+        <a:font script="Telu" typeface="Gautami"/>
+        <a:font script="Taml" typeface="Latha"/>
+        <a:font script="Syrc" typeface="Estrangelo Edessa"/>
+        <a:font script="Orya" typeface="Kalinga"/>
+        <a:font script="Mlym" typeface="Kartika"/>
+        <a:font script="Laoo" typeface="DokChampa"/>
+        <a:font script="Sinh" typeface="Iskoola Pota"/>
+        <a:font script="Mong" typeface="Mongolian Baiti"/>
+        <a:font script="Viet" typeface="Times New Roman"/>
+        <a:font script="Uigh" typeface="Microsoft Uighur"/>
+        <a:font script="Geor" typeface="Sylfaen"/>
+        <a:font script="Armn" typeface="Arial"/>
+        <a:font script="Bugi" typeface="Leelawadee UI"/>
+        <a:font script="Bopo" typeface="Microsoft JhengHei"/>
+        <a:font script="Java" typeface="Javanese Text"/>
+        <a:font script="Lisu" typeface="Segoe UI"/>
+        <a:font script="Mymr" typeface="Myanmar Text"/>
+        <a:font script="Nkoo" typeface="Ebrima"/>
+        <a:font script="Olck" typeface="Nirmala UI"/>
+        <a:font script="Osma" typeface="Ebrima"/>
+        <a:font script="Phag" typeface="Phagspa"/>
+        <a:font script="Syrn" typeface="Estrangelo Edessa"/>
+        <a:font script="Syrj" typeface="Estrangelo Edessa"/>
+        <a:font script="Syre" typeface="Estrangelo Edessa"/>
+        <a:font script="Sora" typeface="Nirmala UI"/>
+        <a:font script="Tale" typeface="Microsoft Tai Le"/>
+        <a:font script="Talu" typeface="Microsoft New Tai Lue"/>
+        <a:font script="Tfng" typeface="Ebrima"/>
+      </a:majorFont>
+      <a:minorFont>
+        <a:latin typeface="Calibri" panose="020F0502020204030204"/>
+        <a:ea typeface=""/>
+        <a:cs typeface=""/>
+        <a:font script="Jpan" typeface="游ゴシック"/>
+        <a:font script="Hang" typeface="맑은 고딕"/>
+        <a:font script="Hans" typeface="等线"/>
+        <a:font script="Hant" typeface="新細明體"/>
+        <a:font script="Arab" typeface="Arial"/>
+        <a:font script="Hebr" typeface="Arial"/>
+        <a:font script="Thai" typeface="Cordia New"/>
+        <a:font script="Ethi" typeface="Nyala"/>
+        <a:font script="Beng" typeface="Vrinda"/>
+        <a:font script="Gujr" typeface="Shruti"/>
+        <a:font script="Khmr" typeface="DaunPenh"/>
+        <a:font script="Knda" typeface="Tunga"/>
+        <a:font script="Guru" typeface="Raavi"/>
+        <a:font script="Cans" typeface="Euphemia"/>
+        <a:font script="Cher" typeface="Plantagenet Cherokee"/>
+        <a:font script="Yiii" typeface="Microsoft Yi Baiti"/>
+        <a:font script="Tibt" typeface="Microsoft Himalaya"/>
+        <a:font script="Thaa" typeface="MV Boli"/>
+        <a:font script="Deva" typeface="Mangal"/>
+        <a:font script="Telu" typeface="Gautami"/>
+        <a:font script="Taml" typeface="Latha"/>
+        <a:font script="Syrc" typeface="Estrangelo Edessa"/>
+        <a:font script="Orya" typeface="Kalinga"/>
+        <a:font script="Mlym" typeface="Kartika"/>
+        <a:font script="Laoo" typeface="DokChampa"/>
+        <a:font script="Sinh" typeface="Iskoola Pota"/>
+        <a:font script="Mong" typeface="Mongolian Baiti"/>
+        <a:font script="Viet" typeface="Arial"/>
+        <a:font script="Uigh" typeface="Microsoft Uighur"/>
+        <a:font script="Geor" typeface="Sylfaen"/>
+        <a:font script="Armn" typeface="Arial"/>
+        <a:font script="Bugi" typeface="Leelawadee UI"/>
+        <a:font script="Bopo" typeface="Microsoft JhengHei"/>
+        <a:font script="Java" typeface="Javanese Text"/>
+        <a:font script="Lisu" typeface="Segoe UI"/>
+        <a:font script="Mymr" typeface="Myanmar Text"/>
+        <a:font script="Nkoo" typeface="Ebrima"/>
+        <a:font script="Olck" typeface="Nirmala UI"/>
+        <a:font script="Osma" typeface="Ebrima"/>
+        <a:font script="Phag" typeface="Phagspa"/>
+        <a:font script="Syrn" typeface="Estrangelo Edessa"/>
+        <a:font script="Syrj" typeface="Estrangelo Edessa"/>
+        <a:font script="Syre" typeface="Estrangelo Edessa"/>
+        <a:font script="Sora" typeface="Nirmala UI"/>
+        <a:font script="Tale" typeface="Microsoft Tai Le"/>
+        <a:font script="Talu" typeface="Microsoft New Tai Lue"/>
+        <a:font script="Tfng" typeface="Ebrima"/>
+      </a:minorFont>
+    </a:fontScheme>
+    <a:fmtScheme name="Office">
+      <a:fillStyleLst>
+        <a:solidFill>
+          <a:schemeClr val="phClr"/>
+        </a:solidFill>
+        <a:gradFill rotWithShape="1">
+          <a:gsLst>
+            <a:gs pos="0">
+              <a:schemeClr val="phClr">
+                <a:lumMod val="110000"/>
+                <a:satMod val="105000"/>
+                <a:tint val="67000"/>
+              </a:schemeClr>
+            </a:gs>
+            <a:gs pos="50000">
+              <a:schemeClr val="phClr">
+                <a:lumMod val="105000"/>
+                <a:satMod val="103000"/>
+                <a:tint val="73000"/>
+              </a:schemeClr>
+            </a:gs>
+            <a:gs pos="100000">
+              <a:schemeClr val="phClr">
+                <a:lumMod val="105000"/>
+                <a:satMod val="109000"/>
+                <a:tint val="81000"/>
+              </a:schemeClr>
+            </a:gs>
+          </a:gsLst>
+          <a:lin ang="5400000" scaled="0"/>
+        </a:gradFill>
+        <a:gradFill rotWithShape="1">
+          <a:gsLst>
+            <a:gs pos="0">
+              <a:schemeClr val="phClr">
+                <a:satMod val="103000"/>
+                <a:lumMod val="102000"/>
+                <a:tint val="94000"/>
+              </a:schemeClr>
+            </a:gs>
+            <a:gs pos="50000">
+              <a:schemeClr val="phClr">
+                <a:satMod val="110000"/>
+                <a:lumMod val="100000"/>
+                <a:shade val="100000"/>
+              </a:schemeClr>
+            </a:gs>
+            <a:gs pos="100000">
+              <a:schemeClr val="phClr">
+                <a:lumMod val="99000"/>
+                <a:satMod val="120000"/>
+                <a:shade val="78000"/>
+              </a:schemeClr>
+            </a:gs>
+          </a:gsLst>
+          <a:lin ang="5400000" scaled="0"/>
+        </a:gradFill>
+      </a:fillStyleLst>
+      <a:lnStyleLst>
+        <a:ln w="6350" cap="flat" cmpd="sng" algn="ctr">
+          <a:solidFill>
+            <a:schemeClr val="phClr"/>
+          </a:solidFill>
+          <a:prstDash val="solid"/>
+          <a:miter lim="800000"/>
+        </a:ln>
+        <a:ln w="12700" cap="flat" cmpd="sng" algn="ctr">
+          <a:solidFill>
+            <a:schemeClr val="phClr"/>
+          </a:solidFill>
+          <a:prstDash val="solid"/>
+          <a:miter lim="800000"/>
+        </a:ln>
+        <a:ln w="19050" cap="flat" cmpd="sng" algn="ctr">
+          <a:solidFill>
+            <a:schemeClr val="phClr"/>
+          </a:solidFill>
+          <a:prstDash val="solid"/>
+          <a:miter lim="800000"/>
+        </a:ln>
+      </a:lnStyleLst>
+      <a:effectStyleLst>
+        <a:effectStyle>
+          <a:effectLst/>
+        </a:effectStyle>
+        <a:effectStyle>
+          <a:effectLst/>
+        </a:effectStyle>
+        <a:effectStyle>
+          <a:effectLst>
+            <a:outerShdw blurRad="57150" dist="19050" dir="5400000" algn="ctr" rotWithShape="0">
+              <a:srgbClr val="000000">
+                <a:alpha val="63000"/>
+              </a:srgbClr>
+            </a:outerShdw>
+          </a:effectLst>
+        </a:effectStyle>
+      </a:effectStyleLst>
+      <a:bgFillStyleLst>
+        <a:solidFill>
+          <a:schemeClr val="phClr"/>
+        </a:solidFill>
+        <a:solidFill>
+          <a:schemeClr val="phClr">
+            <a:tint val="95000"/>
+            <a:satMod val="170000"/>
+          </a:schemeClr>
+        </a:solidFill>
+        <a:gradFill rotWithShape="1">
+          <a:gsLst>
+            <a:gs pos="0">
+              <a:schemeClr val="phClr">
+                <a:tint val="93000"/>
+                <a:satMod val="150000"/>
+                <a:shade val="98000"/>
+                <a:lumMod val="102000"/>
+              </a:schemeClr>
+            </a:gs>
+            <a:gs pos="50000">
+              <a:schemeClr val="phClr">
+                <a:tint val="98000"/>
+                <a:satMod val="130000"/>
+                <a:shade val="90000"/>
+                <a:lumMod val="103000"/>
+              </a:schemeClr>
+            </a:gs>
+            <a:gs pos="100000">
+              <a:schemeClr val="phClr">
+                <a:shade val="63000"/>
+                <a:satMod val="120000"/>
+              </a:schemeClr>
+            </a:gs>
+          </a:gsLst>
+          <a:lin ang="5400000" scaled="0"/>
+        </a:gradFill>
+      </a:bgFillStyleLst>
+    </a:fmtScheme>
+  </a:themeElements>
+  <a:objectDefaults/>
+  <a:extraClrSchemeLst/>
+  <a:extLst>
+    <a:ext uri="{05A4C25C-085E-4340-85A3-A5531E510DB2}">
+      <thm15:themeFamily xmlns:thm15="http://schemas.microsoft.com/office/thememl/2012/main" name="Office Theme" id="{62F939B6-93AF-4DB8-9C6B-D6C7DFDC589F}" vid="{4A3C46E8-61CC-4603-A589-7422A47A8E4A}"/>
+    </a:ext>
+  </a:extLst>
+</a:theme>
 </file>
</xml_diff>